<commit_message>
Added details of offensive stages (still WIP)
</commit_message>
<xml_diff>
--- a/OPAR/INTREP VIS OPAR-001 - Syrian ground combat tactics.pptx
+++ b/OPAR/INTREP VIS OPAR-001 - Syrian ground combat tactics.pptx
@@ -5,7 +5,7 @@
     <p:sldMasterId id="2147483648" r:id="rId1"/>
   </p:sldMasterIdLst>
   <p:notesMasterIdLst>
-    <p:notesMasterId r:id="rId12"/>
+    <p:notesMasterId r:id="rId13"/>
   </p:notesMasterIdLst>
   <p:sldIdLst>
     <p:sldId id="257" r:id="rId2"/>
@@ -14,10 +14,11 @@
     <p:sldId id="362" r:id="rId5"/>
     <p:sldId id="371" r:id="rId6"/>
     <p:sldId id="372" r:id="rId7"/>
-    <p:sldId id="369" r:id="rId8"/>
-    <p:sldId id="368" r:id="rId9"/>
-    <p:sldId id="367" r:id="rId10"/>
-    <p:sldId id="365" r:id="rId11"/>
+    <p:sldId id="373" r:id="rId8"/>
+    <p:sldId id="369" r:id="rId9"/>
+    <p:sldId id="368" r:id="rId10"/>
+    <p:sldId id="367" r:id="rId11"/>
+    <p:sldId id="365" r:id="rId12"/>
   </p:sldIdLst>
   <p:sldSz cx="9144000" cy="5143500" type="screen16x9"/>
   <p:notesSz cx="6858000" cy="9144000"/>
@@ -202,7 +203,7 @@
             <a:fld id="{40637A30-8EE1-4060-9976-8832FC89EE34}" type="datetimeFigureOut">
               <a:rPr lang="nb-NO" smtClean="0"/>
               <a:pPr/>
-              <a:t>18.07.2020</a:t>
+              <a:t>31.07.2020</a:t>
             </a:fld>
             <a:endParaRPr lang="nb-NO"/>
           </a:p>
@@ -4254,6 +4255,1226 @@
           <a:p>
             <a:r>
               <a:rPr lang="en-US" dirty="0" smtClean="0"/>
+              <a:t>INDICATORS</a:t>
+            </a:r>
+            <a:endParaRPr lang="en-US" dirty="0"/>
+          </a:p>
+        </p:txBody>
+      </p:sp>
+      <p:sp>
+        <p:nvSpPr>
+          <p:cNvPr id="6" name="TekstSylinder 5"/>
+          <p:cNvSpPr txBox="1"/>
+          <p:nvPr/>
+        </p:nvSpPr>
+        <p:spPr>
+          <a:xfrm>
+            <a:off x="0" y="642924"/>
+            <a:ext cx="8786842" cy="4286280"/>
+          </a:xfrm>
+          <a:prstGeom prst="rect">
+            <a:avLst/>
+          </a:prstGeom>
+          <a:noFill/>
+          <a:ln>
+            <a:noFill/>
+          </a:ln>
+        </p:spPr>
+        <p:txBody>
+          <a:bodyPr wrap="square" rtlCol="0">
+            <a:normAutofit/>
+          </a:bodyPr>
+          <a:lstStyle/>
+          <a:p>
+            <a:pPr>
+              <a:buFont typeface="Arial" pitchFamily="34" charset="0"/>
+              <a:buChar char="•"/>
+            </a:pPr>
+            <a:r>
+              <a:rPr lang="nb-NO" sz="1200" dirty="0" smtClean="0"/>
+              <a:t>BM-21 </a:t>
+            </a:r>
+            <a:r>
+              <a:rPr lang="nb-NO" sz="1200" dirty="0" err="1" smtClean="0"/>
+              <a:t>launch</a:t>
+            </a:r>
+            <a:r>
+              <a:rPr lang="nb-NO" sz="1200" dirty="0" smtClean="0"/>
+              <a:t> or </a:t>
+            </a:r>
+            <a:r>
+              <a:rPr lang="nb-NO" sz="1200" dirty="0" err="1" smtClean="0"/>
+              <a:t>movement</a:t>
+            </a:r>
+            <a:r>
+              <a:rPr lang="nb-NO" sz="1200" dirty="0" smtClean="0"/>
+              <a:t> </a:t>
+            </a:r>
+            <a:r>
+              <a:rPr lang="nb-NO" sz="1200" dirty="0" err="1" smtClean="0"/>
+              <a:t>into</a:t>
+            </a:r>
+            <a:r>
+              <a:rPr lang="nb-NO" sz="1200" dirty="0" smtClean="0"/>
+              <a:t> firing </a:t>
+            </a:r>
+            <a:r>
+              <a:rPr lang="nb-NO" sz="1200" dirty="0" err="1" smtClean="0"/>
+              <a:t>positions</a:t>
+            </a:r>
+            <a:r>
+              <a:rPr lang="nb-NO" sz="1200" dirty="0" smtClean="0"/>
+              <a:t>. </a:t>
+            </a:r>
+          </a:p>
+          <a:p>
+            <a:pPr lvl="1">
+              <a:buFont typeface="Arial" pitchFamily="34" charset="0"/>
+              <a:buChar char="•"/>
+            </a:pPr>
+            <a:r>
+              <a:rPr lang="nb-NO" sz="1200" dirty="0" smtClean="0"/>
+              <a:t>Preparing offensive / </a:t>
+            </a:r>
+            <a:r>
+              <a:rPr lang="nb-NO" sz="1200" dirty="0" err="1" smtClean="0"/>
+              <a:t>Attack</a:t>
+            </a:r>
+            <a:endParaRPr lang="nb-NO" sz="1200" dirty="0" smtClean="0"/>
+          </a:p>
+          <a:p>
+            <a:pPr>
+              <a:buFont typeface="Arial" pitchFamily="34" charset="0"/>
+              <a:buChar char="•"/>
+            </a:pPr>
+            <a:r>
+              <a:rPr lang="nb-NO" sz="1200" dirty="0" smtClean="0"/>
+              <a:t>RW </a:t>
+            </a:r>
+            <a:r>
+              <a:rPr lang="nb-NO" sz="1200" dirty="0" err="1" smtClean="0"/>
+              <a:t>activity</a:t>
+            </a:r>
+            <a:r>
+              <a:rPr lang="nb-NO" sz="1200" dirty="0" smtClean="0"/>
+              <a:t> </a:t>
+            </a:r>
+            <a:r>
+              <a:rPr lang="nb-NO" sz="1200" dirty="0" err="1" smtClean="0"/>
+              <a:t>deep</a:t>
+            </a:r>
+            <a:r>
+              <a:rPr lang="nb-NO" sz="1200" dirty="0" smtClean="0"/>
+              <a:t> </a:t>
+            </a:r>
+            <a:r>
+              <a:rPr lang="nb-NO" sz="1200" dirty="0" err="1" smtClean="0"/>
+              <a:t>into</a:t>
+            </a:r>
+            <a:r>
+              <a:rPr lang="nb-NO" sz="1200" dirty="0" smtClean="0"/>
+              <a:t> </a:t>
+            </a:r>
+            <a:r>
+              <a:rPr lang="nb-NO" sz="1200" dirty="0" err="1" smtClean="0"/>
+              <a:t>enemy</a:t>
+            </a:r>
+            <a:r>
+              <a:rPr lang="nb-NO" sz="1200" dirty="0" smtClean="0"/>
+              <a:t> </a:t>
+            </a:r>
+            <a:r>
+              <a:rPr lang="nb-NO" sz="1200" dirty="0" err="1" smtClean="0"/>
+              <a:t>territory</a:t>
+            </a:r>
+            <a:endParaRPr lang="nb-NO" sz="1200" dirty="0" smtClean="0"/>
+          </a:p>
+          <a:p>
+            <a:pPr lvl="1">
+              <a:buFont typeface="Arial" pitchFamily="34" charset="0"/>
+              <a:buChar char="•"/>
+            </a:pPr>
+            <a:r>
+              <a:rPr lang="nb-NO" sz="1200" dirty="0" err="1" smtClean="0"/>
+              <a:t>Insertion</a:t>
+            </a:r>
+            <a:r>
+              <a:rPr lang="nb-NO" sz="1200" dirty="0" smtClean="0"/>
+              <a:t> </a:t>
+            </a:r>
+            <a:r>
+              <a:rPr lang="nb-NO" sz="1200" dirty="0" err="1" smtClean="0"/>
+              <a:t>of</a:t>
+            </a:r>
+            <a:r>
+              <a:rPr lang="nb-NO" sz="1200" dirty="0" smtClean="0"/>
+              <a:t> Long Range </a:t>
+            </a:r>
+            <a:r>
+              <a:rPr lang="nb-NO" sz="1200" dirty="0" err="1" smtClean="0"/>
+              <a:t>Recon</a:t>
+            </a:r>
+            <a:endParaRPr lang="nb-NO" sz="1200" dirty="0" smtClean="0"/>
+          </a:p>
+          <a:p>
+            <a:pPr>
+              <a:buFont typeface="Arial" pitchFamily="34" charset="0"/>
+              <a:buChar char="•"/>
+            </a:pPr>
+            <a:r>
+              <a:rPr lang="nb-NO" sz="1200" dirty="0" smtClean="0"/>
+              <a:t>FW (transport) </a:t>
+            </a:r>
+            <a:r>
+              <a:rPr lang="nb-NO" sz="1200" dirty="0" err="1" smtClean="0"/>
+              <a:t>activity</a:t>
+            </a:r>
+            <a:r>
+              <a:rPr lang="nb-NO" sz="1200" dirty="0" smtClean="0"/>
+              <a:t> </a:t>
+            </a:r>
+            <a:r>
+              <a:rPr lang="nb-NO" sz="1200" dirty="0" err="1" smtClean="0"/>
+              <a:t>deep</a:t>
+            </a:r>
+            <a:r>
+              <a:rPr lang="nb-NO" sz="1200" dirty="0" smtClean="0"/>
+              <a:t> </a:t>
+            </a:r>
+            <a:r>
+              <a:rPr lang="nb-NO" sz="1200" dirty="0" err="1" smtClean="0"/>
+              <a:t>into</a:t>
+            </a:r>
+            <a:r>
+              <a:rPr lang="nb-NO" sz="1200" dirty="0" smtClean="0"/>
+              <a:t> </a:t>
+            </a:r>
+            <a:r>
+              <a:rPr lang="nb-NO" sz="1200" dirty="0" err="1" smtClean="0"/>
+              <a:t>enemy</a:t>
+            </a:r>
+            <a:r>
+              <a:rPr lang="nb-NO" sz="1200" dirty="0" smtClean="0"/>
+              <a:t> </a:t>
+            </a:r>
+            <a:r>
+              <a:rPr lang="nb-NO" sz="1200" dirty="0" err="1" smtClean="0"/>
+              <a:t>territory</a:t>
+            </a:r>
+            <a:endParaRPr lang="nb-NO" sz="1200" dirty="0" smtClean="0"/>
+          </a:p>
+          <a:p>
+            <a:pPr lvl="1">
+              <a:buFont typeface="Arial" pitchFamily="34" charset="0"/>
+              <a:buChar char="•"/>
+            </a:pPr>
+            <a:r>
+              <a:rPr lang="nb-NO" sz="1200" dirty="0" err="1" smtClean="0"/>
+              <a:t>Airborne</a:t>
+            </a:r>
+            <a:r>
+              <a:rPr lang="nb-NO" sz="1200" dirty="0" smtClean="0"/>
+              <a:t> </a:t>
+            </a:r>
+            <a:r>
+              <a:rPr lang="nb-NO" sz="1200" dirty="0" err="1" smtClean="0"/>
+              <a:t>Assault</a:t>
+            </a:r>
+            <a:r>
+              <a:rPr lang="nb-NO" sz="1200" dirty="0" smtClean="0"/>
+              <a:t> ( </a:t>
+            </a:r>
+            <a:r>
+              <a:rPr lang="nb-NO" sz="1200" dirty="0" err="1" smtClean="0"/>
+              <a:t>Many</a:t>
+            </a:r>
+            <a:r>
+              <a:rPr lang="nb-NO" sz="1200" dirty="0" smtClean="0"/>
+              <a:t> FW transports)</a:t>
+            </a:r>
+          </a:p>
+          <a:p>
+            <a:pPr lvl="1">
+              <a:buFont typeface="Arial" pitchFamily="34" charset="0"/>
+              <a:buChar char="•"/>
+            </a:pPr>
+            <a:r>
+              <a:rPr lang="nb-NO" sz="1200" dirty="0" smtClean="0"/>
+              <a:t>Long range </a:t>
+            </a:r>
+            <a:r>
+              <a:rPr lang="nb-NO" sz="1200" dirty="0" err="1" smtClean="0"/>
+              <a:t>Recon</a:t>
+            </a:r>
+            <a:r>
+              <a:rPr lang="nb-NO" sz="1200" dirty="0" smtClean="0"/>
+              <a:t> ( </a:t>
+            </a:r>
+            <a:r>
+              <a:rPr lang="nb-NO" sz="1200" dirty="0" err="1" smtClean="0"/>
+              <a:t>If</a:t>
+            </a:r>
+            <a:r>
+              <a:rPr lang="nb-NO" sz="1200" dirty="0" smtClean="0"/>
+              <a:t> </a:t>
+            </a:r>
+            <a:r>
+              <a:rPr lang="nb-NO" sz="1200" dirty="0" err="1" smtClean="0"/>
+              <a:t>only</a:t>
+            </a:r>
+            <a:r>
+              <a:rPr lang="nb-NO" sz="1200" dirty="0" smtClean="0"/>
+              <a:t> a single AC is in </a:t>
+            </a:r>
+            <a:r>
+              <a:rPr lang="nb-NO" sz="1200" dirty="0" err="1" smtClean="0"/>
+              <a:t>use</a:t>
+            </a:r>
+            <a:r>
+              <a:rPr lang="nb-NO" sz="1200" dirty="0" smtClean="0"/>
+              <a:t>, or flying </a:t>
+            </a:r>
+            <a:r>
+              <a:rPr lang="nb-NO" sz="1200" dirty="0" err="1" smtClean="0"/>
+              <a:t>tactical</a:t>
+            </a:r>
+            <a:r>
+              <a:rPr lang="nb-NO" sz="1200" dirty="0" smtClean="0"/>
+              <a:t>, </a:t>
+            </a:r>
+            <a:r>
+              <a:rPr lang="nb-NO" sz="1200" dirty="0" err="1" smtClean="0"/>
+              <a:t>low</a:t>
+            </a:r>
+            <a:r>
+              <a:rPr lang="nb-NO" sz="1200" dirty="0" smtClean="0"/>
+              <a:t> </a:t>
+            </a:r>
+            <a:r>
+              <a:rPr lang="nb-NO" sz="1200" dirty="0" err="1" smtClean="0"/>
+              <a:t>level</a:t>
+            </a:r>
+            <a:r>
+              <a:rPr lang="nb-NO" sz="1200" dirty="0" smtClean="0"/>
+              <a:t>)</a:t>
+            </a:r>
+          </a:p>
+          <a:p>
+            <a:pPr>
+              <a:buFont typeface="Arial" pitchFamily="34" charset="0"/>
+              <a:buChar char="•"/>
+            </a:pPr>
+            <a:r>
+              <a:rPr lang="nb-NO" sz="1200" dirty="0" err="1" smtClean="0"/>
+              <a:t>Artillery</a:t>
+            </a:r>
+            <a:r>
+              <a:rPr lang="nb-NO" sz="1200" dirty="0" smtClean="0"/>
+              <a:t> at a </a:t>
+            </a:r>
+            <a:r>
+              <a:rPr lang="nb-NO" sz="1200" dirty="0" err="1" smtClean="0"/>
+              <a:t>certain</a:t>
+            </a:r>
+            <a:r>
+              <a:rPr lang="nb-NO" sz="1200" dirty="0" smtClean="0"/>
+              <a:t> </a:t>
+            </a:r>
+            <a:r>
+              <a:rPr lang="nb-NO" sz="1200" dirty="0" err="1" smtClean="0"/>
+              <a:t>point</a:t>
+            </a:r>
+            <a:r>
+              <a:rPr lang="nb-NO" sz="1200" dirty="0" smtClean="0"/>
+              <a:t> (</a:t>
+            </a:r>
+            <a:r>
+              <a:rPr lang="nb-NO" sz="1200" dirty="0" err="1" smtClean="0"/>
+              <a:t>point</a:t>
+            </a:r>
+            <a:r>
+              <a:rPr lang="nb-NO" sz="1200" dirty="0" smtClean="0"/>
+              <a:t> target)</a:t>
+            </a:r>
+          </a:p>
+          <a:p>
+            <a:pPr lvl="1">
+              <a:buFont typeface="Arial" pitchFamily="34" charset="0"/>
+              <a:buChar char="•"/>
+            </a:pPr>
+            <a:r>
+              <a:rPr lang="nb-NO" sz="1200" dirty="0" err="1" smtClean="0"/>
+              <a:t>Trying</a:t>
+            </a:r>
+            <a:r>
+              <a:rPr lang="nb-NO" sz="1200" dirty="0" smtClean="0"/>
+              <a:t> to kill the target</a:t>
+            </a:r>
+          </a:p>
+          <a:p>
+            <a:pPr>
+              <a:buFont typeface="Arial" pitchFamily="34" charset="0"/>
+              <a:buChar char="•"/>
+            </a:pPr>
+            <a:r>
+              <a:rPr lang="nb-NO" sz="1200" dirty="0" err="1" smtClean="0"/>
+              <a:t>Artillery</a:t>
+            </a:r>
+            <a:r>
+              <a:rPr lang="nb-NO" sz="1200" dirty="0" smtClean="0"/>
+              <a:t> at an area</a:t>
+            </a:r>
+          </a:p>
+          <a:p>
+            <a:pPr lvl="1">
+              <a:buFont typeface="Arial" pitchFamily="34" charset="0"/>
+              <a:buChar char="•"/>
+            </a:pPr>
+            <a:r>
+              <a:rPr lang="nb-NO" sz="1200" dirty="0" err="1" smtClean="0"/>
+              <a:t>Suppression</a:t>
+            </a:r>
+            <a:r>
+              <a:rPr lang="nb-NO" sz="1200" dirty="0" smtClean="0"/>
+              <a:t>, to cover for </a:t>
+            </a:r>
+            <a:r>
+              <a:rPr lang="nb-NO" sz="1200" dirty="0" err="1" smtClean="0"/>
+              <a:t>movement</a:t>
+            </a:r>
+            <a:r>
+              <a:rPr lang="nb-NO" sz="1200" dirty="0" smtClean="0"/>
+              <a:t> / </a:t>
+            </a:r>
+            <a:r>
+              <a:rPr lang="nb-NO" sz="1200" dirty="0" err="1" smtClean="0"/>
+              <a:t>attack</a:t>
+            </a:r>
+            <a:endParaRPr lang="nb-NO" sz="1200" dirty="0" smtClean="0"/>
+          </a:p>
+          <a:p>
+            <a:pPr>
+              <a:buFont typeface="Arial" pitchFamily="34" charset="0"/>
+              <a:buChar char="•"/>
+            </a:pPr>
+            <a:r>
+              <a:rPr lang="nb-NO" sz="1200" dirty="0" smtClean="0"/>
+              <a:t>Fill </a:t>
+            </a:r>
+            <a:r>
+              <a:rPr lang="nb-NO" sz="1200" dirty="0" err="1" smtClean="0"/>
+              <a:t>out</a:t>
+            </a:r>
+            <a:r>
+              <a:rPr lang="nb-NO" sz="1200" dirty="0" smtClean="0"/>
+              <a:t> </a:t>
+            </a:r>
+            <a:r>
+              <a:rPr lang="nb-NO" sz="1200" dirty="0" err="1" smtClean="0"/>
+              <a:t>many</a:t>
+            </a:r>
+            <a:r>
+              <a:rPr lang="nb-NO" sz="1200" dirty="0" smtClean="0"/>
+              <a:t> more…..</a:t>
+            </a:r>
+          </a:p>
+          <a:p>
+            <a:pPr>
+              <a:buFont typeface="Arial" pitchFamily="34" charset="0"/>
+              <a:buChar char="•"/>
+            </a:pPr>
+            <a:endParaRPr lang="nb-NO" sz="1200" dirty="0" smtClean="0"/>
+          </a:p>
+          <a:p>
+            <a:pPr>
+              <a:buFont typeface="Arial" pitchFamily="34" charset="0"/>
+              <a:buChar char="•"/>
+            </a:pPr>
+            <a:r>
+              <a:rPr lang="nb-NO" sz="1200" dirty="0" err="1" smtClean="0"/>
+              <a:t>Artillery</a:t>
+            </a:r>
+            <a:r>
+              <a:rPr lang="nb-NO" sz="1200" dirty="0" smtClean="0"/>
+              <a:t> </a:t>
+            </a:r>
+            <a:r>
+              <a:rPr lang="nb-NO" sz="1200" dirty="0" err="1" smtClean="0"/>
+              <a:t>units</a:t>
+            </a:r>
+            <a:r>
+              <a:rPr lang="nb-NO" sz="1200" dirty="0" smtClean="0"/>
+              <a:t> in firing </a:t>
+            </a:r>
+            <a:r>
+              <a:rPr lang="nb-NO" sz="1200" dirty="0" err="1" smtClean="0"/>
+              <a:t>position</a:t>
+            </a:r>
+            <a:r>
+              <a:rPr lang="nb-NO" sz="1200" dirty="0" smtClean="0"/>
+              <a:t> (</a:t>
+            </a:r>
+            <a:r>
+              <a:rPr lang="nb-NO" sz="1200" dirty="0" err="1" smtClean="0"/>
+              <a:t>spread</a:t>
+            </a:r>
+            <a:r>
+              <a:rPr lang="nb-NO" sz="1200" dirty="0" smtClean="0"/>
+              <a:t> </a:t>
+            </a:r>
+            <a:r>
+              <a:rPr lang="nb-NO" sz="1200" dirty="0" err="1" smtClean="0"/>
+              <a:t>out</a:t>
+            </a:r>
+            <a:r>
+              <a:rPr lang="nb-NO" sz="1200" dirty="0" smtClean="0"/>
+              <a:t>, IAW a </a:t>
+            </a:r>
+            <a:r>
+              <a:rPr lang="nb-NO" sz="1200" dirty="0" err="1" smtClean="0"/>
+              <a:t>template</a:t>
+            </a:r>
+            <a:r>
+              <a:rPr lang="nb-NO" sz="1200" dirty="0" smtClean="0"/>
+              <a:t>)</a:t>
+            </a:r>
+          </a:p>
+          <a:p>
+            <a:pPr>
+              <a:buFont typeface="Arial" pitchFamily="34" charset="0"/>
+              <a:buChar char="•"/>
+            </a:pPr>
+            <a:r>
+              <a:rPr lang="nb-NO" sz="1200" dirty="0" smtClean="0"/>
+              <a:t>General </a:t>
+            </a:r>
+            <a:r>
+              <a:rPr lang="nb-NO" sz="1200" dirty="0" err="1" smtClean="0"/>
+              <a:t>convoy</a:t>
+            </a:r>
+            <a:r>
+              <a:rPr lang="nb-NO" sz="1200" dirty="0" smtClean="0"/>
+              <a:t> </a:t>
+            </a:r>
+            <a:r>
+              <a:rPr lang="nb-NO" sz="1200" dirty="0" err="1" smtClean="0"/>
+              <a:t>movement</a:t>
+            </a:r>
+            <a:endParaRPr lang="nb-NO" sz="1200" dirty="0" smtClean="0"/>
+          </a:p>
+          <a:p>
+            <a:pPr lvl="1">
+              <a:buFont typeface="Arial" pitchFamily="34" charset="0"/>
+              <a:buChar char="•"/>
+            </a:pPr>
+            <a:r>
+              <a:rPr lang="nb-NO" sz="1200" dirty="0" err="1" smtClean="0"/>
+              <a:t>Upcoming</a:t>
+            </a:r>
+            <a:r>
+              <a:rPr lang="nb-NO" sz="1200" dirty="0" smtClean="0"/>
+              <a:t> action (offensive), in a </a:t>
+            </a:r>
+            <a:r>
+              <a:rPr lang="nb-NO" sz="1200" dirty="0" err="1" smtClean="0"/>
+              <a:t>certian</a:t>
+            </a:r>
+            <a:r>
+              <a:rPr lang="nb-NO" sz="1200" dirty="0" smtClean="0"/>
+              <a:t> </a:t>
+            </a:r>
+            <a:r>
+              <a:rPr lang="nb-NO" sz="1200" dirty="0" err="1" smtClean="0"/>
+              <a:t>amount</a:t>
+            </a:r>
+            <a:r>
+              <a:rPr lang="nb-NO" sz="1200" dirty="0" smtClean="0"/>
+              <a:t> </a:t>
+            </a:r>
+            <a:r>
+              <a:rPr lang="nb-NO" sz="1200" dirty="0" err="1" smtClean="0"/>
+              <a:t>of</a:t>
+            </a:r>
+            <a:r>
+              <a:rPr lang="nb-NO" sz="1200" dirty="0" smtClean="0"/>
+              <a:t> time</a:t>
+            </a:r>
+          </a:p>
+        </p:txBody>
+      </p:sp>
+      <p:sp>
+        <p:nvSpPr>
+          <p:cNvPr id="7" name="Ellipse 6"/>
+          <p:cNvSpPr/>
+          <p:nvPr/>
+        </p:nvSpPr>
+        <p:spPr>
+          <a:xfrm>
+            <a:off x="-928726" y="1000114"/>
+            <a:ext cx="214314" cy="214314"/>
+          </a:xfrm>
+          <a:prstGeom prst="ellipse">
+            <a:avLst/>
+          </a:prstGeom>
+          <a:solidFill>
+            <a:srgbClr val="C00000"/>
+          </a:solidFill>
+          <a:ln>
+            <a:solidFill>
+              <a:schemeClr val="tx1"/>
+            </a:solidFill>
+          </a:ln>
+        </p:spPr>
+        <p:style>
+          <a:lnRef idx="2">
+            <a:schemeClr val="accent1">
+              <a:shade val="50000"/>
+            </a:schemeClr>
+          </a:lnRef>
+          <a:fillRef idx="1">
+            <a:schemeClr val="accent1"/>
+          </a:fillRef>
+          <a:effectRef idx="0">
+            <a:schemeClr val="accent1"/>
+          </a:effectRef>
+          <a:fontRef idx="minor">
+            <a:schemeClr val="lt1"/>
+          </a:fontRef>
+        </p:style>
+        <p:txBody>
+          <a:bodyPr lIns="0" tIns="0" rIns="0" bIns="0" rtlCol="0" anchor="ctr"/>
+          <a:lstStyle/>
+          <a:p>
+            <a:pPr algn="ctr"/>
+            <a:r>
+              <a:rPr lang="nb-NO" sz="1200" dirty="0" smtClean="0"/>
+              <a:t>A</a:t>
+            </a:r>
+            <a:endParaRPr lang="nb-NO" sz="1200" dirty="0"/>
+          </a:p>
+        </p:txBody>
+      </p:sp>
+      <p:sp>
+        <p:nvSpPr>
+          <p:cNvPr id="8" name="Ellipse 7"/>
+          <p:cNvSpPr/>
+          <p:nvPr/>
+        </p:nvSpPr>
+        <p:spPr>
+          <a:xfrm>
+            <a:off x="-642974" y="1000114"/>
+            <a:ext cx="214314" cy="214314"/>
+          </a:xfrm>
+          <a:prstGeom prst="ellipse">
+            <a:avLst/>
+          </a:prstGeom>
+          <a:solidFill>
+            <a:srgbClr val="C00000"/>
+          </a:solidFill>
+          <a:ln>
+            <a:solidFill>
+              <a:schemeClr val="tx1"/>
+            </a:solidFill>
+          </a:ln>
+        </p:spPr>
+        <p:style>
+          <a:lnRef idx="2">
+            <a:schemeClr val="accent1">
+              <a:shade val="50000"/>
+            </a:schemeClr>
+          </a:lnRef>
+          <a:fillRef idx="1">
+            <a:schemeClr val="accent1"/>
+          </a:fillRef>
+          <a:effectRef idx="0">
+            <a:schemeClr val="accent1"/>
+          </a:effectRef>
+          <a:fontRef idx="minor">
+            <a:schemeClr val="lt1"/>
+          </a:fontRef>
+        </p:style>
+        <p:txBody>
+          <a:bodyPr lIns="0" tIns="0" rIns="0" bIns="0" rtlCol="0" anchor="ctr"/>
+          <a:lstStyle/>
+          <a:p>
+            <a:pPr algn="ctr"/>
+            <a:r>
+              <a:rPr lang="nb-NO" sz="1200" dirty="0" smtClean="0"/>
+              <a:t>A</a:t>
+            </a:r>
+            <a:endParaRPr lang="nb-NO" sz="1200" dirty="0"/>
+          </a:p>
+        </p:txBody>
+      </p:sp>
+      <p:sp>
+        <p:nvSpPr>
+          <p:cNvPr id="9" name="Ellipse 8"/>
+          <p:cNvSpPr/>
+          <p:nvPr/>
+        </p:nvSpPr>
+        <p:spPr>
+          <a:xfrm>
+            <a:off x="-928726" y="1285866"/>
+            <a:ext cx="214314" cy="214314"/>
+          </a:xfrm>
+          <a:prstGeom prst="ellipse">
+            <a:avLst/>
+          </a:prstGeom>
+          <a:solidFill>
+            <a:srgbClr val="C00000"/>
+          </a:solidFill>
+          <a:ln>
+            <a:solidFill>
+              <a:schemeClr val="tx1"/>
+            </a:solidFill>
+          </a:ln>
+        </p:spPr>
+        <p:style>
+          <a:lnRef idx="2">
+            <a:schemeClr val="accent1">
+              <a:shade val="50000"/>
+            </a:schemeClr>
+          </a:lnRef>
+          <a:fillRef idx="1">
+            <a:schemeClr val="accent1"/>
+          </a:fillRef>
+          <a:effectRef idx="0">
+            <a:schemeClr val="accent1"/>
+          </a:effectRef>
+          <a:fontRef idx="minor">
+            <a:schemeClr val="lt1"/>
+          </a:fontRef>
+        </p:style>
+        <p:txBody>
+          <a:bodyPr lIns="0" tIns="0" rIns="0" bIns="0" rtlCol="0" anchor="ctr"/>
+          <a:lstStyle/>
+          <a:p>
+            <a:pPr algn="ctr"/>
+            <a:r>
+              <a:rPr lang="nb-NO" sz="1200" dirty="0" smtClean="0"/>
+              <a:t>B</a:t>
+            </a:r>
+            <a:endParaRPr lang="nb-NO" sz="1200" dirty="0"/>
+          </a:p>
+        </p:txBody>
+      </p:sp>
+      <p:sp>
+        <p:nvSpPr>
+          <p:cNvPr id="10" name="Ellipse 9"/>
+          <p:cNvSpPr/>
+          <p:nvPr/>
+        </p:nvSpPr>
+        <p:spPr>
+          <a:xfrm>
+            <a:off x="-642974" y="1285866"/>
+            <a:ext cx="214314" cy="214314"/>
+          </a:xfrm>
+          <a:prstGeom prst="ellipse">
+            <a:avLst/>
+          </a:prstGeom>
+          <a:solidFill>
+            <a:srgbClr val="C00000"/>
+          </a:solidFill>
+          <a:ln>
+            <a:solidFill>
+              <a:schemeClr val="tx1"/>
+            </a:solidFill>
+          </a:ln>
+        </p:spPr>
+        <p:style>
+          <a:lnRef idx="2">
+            <a:schemeClr val="accent1">
+              <a:shade val="50000"/>
+            </a:schemeClr>
+          </a:lnRef>
+          <a:fillRef idx="1">
+            <a:schemeClr val="accent1"/>
+          </a:fillRef>
+          <a:effectRef idx="0">
+            <a:schemeClr val="accent1"/>
+          </a:effectRef>
+          <a:fontRef idx="minor">
+            <a:schemeClr val="lt1"/>
+          </a:fontRef>
+        </p:style>
+        <p:txBody>
+          <a:bodyPr lIns="0" tIns="0" rIns="0" bIns="0" rtlCol="0" anchor="ctr"/>
+          <a:lstStyle/>
+          <a:p>
+            <a:pPr algn="ctr"/>
+            <a:r>
+              <a:rPr lang="nb-NO" sz="1200" dirty="0" smtClean="0"/>
+              <a:t>B</a:t>
+            </a:r>
+            <a:endParaRPr lang="nb-NO" sz="1200" dirty="0"/>
+          </a:p>
+        </p:txBody>
+      </p:sp>
+      <p:sp>
+        <p:nvSpPr>
+          <p:cNvPr id="11" name="Ellipse 10"/>
+          <p:cNvSpPr/>
+          <p:nvPr/>
+        </p:nvSpPr>
+        <p:spPr>
+          <a:xfrm>
+            <a:off x="-928726" y="1571618"/>
+            <a:ext cx="214314" cy="214314"/>
+          </a:xfrm>
+          <a:prstGeom prst="ellipse">
+            <a:avLst/>
+          </a:prstGeom>
+          <a:solidFill>
+            <a:srgbClr val="C00000"/>
+          </a:solidFill>
+          <a:ln>
+            <a:solidFill>
+              <a:schemeClr val="tx1"/>
+            </a:solidFill>
+          </a:ln>
+        </p:spPr>
+        <p:style>
+          <a:lnRef idx="2">
+            <a:schemeClr val="accent1">
+              <a:shade val="50000"/>
+            </a:schemeClr>
+          </a:lnRef>
+          <a:fillRef idx="1">
+            <a:schemeClr val="accent1"/>
+          </a:fillRef>
+          <a:effectRef idx="0">
+            <a:schemeClr val="accent1"/>
+          </a:effectRef>
+          <a:fontRef idx="minor">
+            <a:schemeClr val="lt1"/>
+          </a:fontRef>
+        </p:style>
+        <p:txBody>
+          <a:bodyPr lIns="0" tIns="0" rIns="0" bIns="0" rtlCol="0" anchor="ctr"/>
+          <a:lstStyle/>
+          <a:p>
+            <a:pPr algn="ctr"/>
+            <a:r>
+              <a:rPr lang="nb-NO" sz="1200" dirty="0" smtClean="0"/>
+              <a:t>C</a:t>
+            </a:r>
+            <a:endParaRPr lang="nb-NO" sz="1200" dirty="0"/>
+          </a:p>
+        </p:txBody>
+      </p:sp>
+      <p:sp>
+        <p:nvSpPr>
+          <p:cNvPr id="12" name="Ellipse 11"/>
+          <p:cNvSpPr/>
+          <p:nvPr/>
+        </p:nvSpPr>
+        <p:spPr>
+          <a:xfrm>
+            <a:off x="-642974" y="1571618"/>
+            <a:ext cx="214314" cy="214314"/>
+          </a:xfrm>
+          <a:prstGeom prst="ellipse">
+            <a:avLst/>
+          </a:prstGeom>
+          <a:solidFill>
+            <a:srgbClr val="C00000"/>
+          </a:solidFill>
+          <a:ln>
+            <a:solidFill>
+              <a:schemeClr val="tx1"/>
+            </a:solidFill>
+          </a:ln>
+        </p:spPr>
+        <p:style>
+          <a:lnRef idx="2">
+            <a:schemeClr val="accent1">
+              <a:shade val="50000"/>
+            </a:schemeClr>
+          </a:lnRef>
+          <a:fillRef idx="1">
+            <a:schemeClr val="accent1"/>
+          </a:fillRef>
+          <a:effectRef idx="0">
+            <a:schemeClr val="accent1"/>
+          </a:effectRef>
+          <a:fontRef idx="minor">
+            <a:schemeClr val="lt1"/>
+          </a:fontRef>
+        </p:style>
+        <p:txBody>
+          <a:bodyPr lIns="0" tIns="0" rIns="0" bIns="0" rtlCol="0" anchor="ctr"/>
+          <a:lstStyle/>
+          <a:p>
+            <a:pPr algn="ctr"/>
+            <a:r>
+              <a:rPr lang="nb-NO" sz="1200" dirty="0" smtClean="0"/>
+              <a:t>C</a:t>
+            </a:r>
+            <a:endParaRPr lang="nb-NO" sz="1200" dirty="0"/>
+          </a:p>
+        </p:txBody>
+      </p:sp>
+      <p:sp>
+        <p:nvSpPr>
+          <p:cNvPr id="13" name="Ellipse 12"/>
+          <p:cNvSpPr/>
+          <p:nvPr/>
+        </p:nvSpPr>
+        <p:spPr>
+          <a:xfrm>
+            <a:off x="-928726" y="1857370"/>
+            <a:ext cx="214314" cy="214314"/>
+          </a:xfrm>
+          <a:prstGeom prst="ellipse">
+            <a:avLst/>
+          </a:prstGeom>
+          <a:solidFill>
+            <a:srgbClr val="C00000"/>
+          </a:solidFill>
+          <a:ln>
+            <a:solidFill>
+              <a:schemeClr val="tx1"/>
+            </a:solidFill>
+          </a:ln>
+        </p:spPr>
+        <p:style>
+          <a:lnRef idx="2">
+            <a:schemeClr val="accent1">
+              <a:shade val="50000"/>
+            </a:schemeClr>
+          </a:lnRef>
+          <a:fillRef idx="1">
+            <a:schemeClr val="accent1"/>
+          </a:fillRef>
+          <a:effectRef idx="0">
+            <a:schemeClr val="accent1"/>
+          </a:effectRef>
+          <a:fontRef idx="minor">
+            <a:schemeClr val="lt1"/>
+          </a:fontRef>
+        </p:style>
+        <p:txBody>
+          <a:bodyPr lIns="0" tIns="0" rIns="0" bIns="0" rtlCol="0" anchor="ctr"/>
+          <a:lstStyle/>
+          <a:p>
+            <a:pPr algn="ctr"/>
+            <a:r>
+              <a:rPr lang="nb-NO" sz="1200" dirty="0" smtClean="0"/>
+              <a:t>D</a:t>
+            </a:r>
+            <a:endParaRPr lang="nb-NO" sz="1200" dirty="0"/>
+          </a:p>
+        </p:txBody>
+      </p:sp>
+      <p:sp>
+        <p:nvSpPr>
+          <p:cNvPr id="14" name="Ellipse 13"/>
+          <p:cNvSpPr/>
+          <p:nvPr/>
+        </p:nvSpPr>
+        <p:spPr>
+          <a:xfrm>
+            <a:off x="-642974" y="1857370"/>
+            <a:ext cx="214314" cy="214314"/>
+          </a:xfrm>
+          <a:prstGeom prst="ellipse">
+            <a:avLst/>
+          </a:prstGeom>
+          <a:solidFill>
+            <a:srgbClr val="C00000"/>
+          </a:solidFill>
+          <a:ln>
+            <a:solidFill>
+              <a:schemeClr val="tx1"/>
+            </a:solidFill>
+          </a:ln>
+        </p:spPr>
+        <p:style>
+          <a:lnRef idx="2">
+            <a:schemeClr val="accent1">
+              <a:shade val="50000"/>
+            </a:schemeClr>
+          </a:lnRef>
+          <a:fillRef idx="1">
+            <a:schemeClr val="accent1"/>
+          </a:fillRef>
+          <a:effectRef idx="0">
+            <a:schemeClr val="accent1"/>
+          </a:effectRef>
+          <a:fontRef idx="minor">
+            <a:schemeClr val="lt1"/>
+          </a:fontRef>
+        </p:style>
+        <p:txBody>
+          <a:bodyPr lIns="0" tIns="0" rIns="0" bIns="0" rtlCol="0" anchor="ctr"/>
+          <a:lstStyle/>
+          <a:p>
+            <a:pPr algn="ctr"/>
+            <a:r>
+              <a:rPr lang="nb-NO" sz="1200" dirty="0" smtClean="0"/>
+              <a:t>D</a:t>
+            </a:r>
+            <a:endParaRPr lang="nb-NO" sz="1200" dirty="0"/>
+          </a:p>
+        </p:txBody>
+      </p:sp>
+      <p:sp>
+        <p:nvSpPr>
+          <p:cNvPr id="15" name="Ellipse 14"/>
+          <p:cNvSpPr/>
+          <p:nvPr/>
+        </p:nvSpPr>
+        <p:spPr>
+          <a:xfrm>
+            <a:off x="-928726" y="2143122"/>
+            <a:ext cx="214314" cy="214314"/>
+          </a:xfrm>
+          <a:prstGeom prst="ellipse">
+            <a:avLst/>
+          </a:prstGeom>
+          <a:solidFill>
+            <a:srgbClr val="C00000"/>
+          </a:solidFill>
+          <a:ln>
+            <a:solidFill>
+              <a:schemeClr val="tx1"/>
+            </a:solidFill>
+          </a:ln>
+        </p:spPr>
+        <p:style>
+          <a:lnRef idx="2">
+            <a:schemeClr val="accent1">
+              <a:shade val="50000"/>
+            </a:schemeClr>
+          </a:lnRef>
+          <a:fillRef idx="1">
+            <a:schemeClr val="accent1"/>
+          </a:fillRef>
+          <a:effectRef idx="0">
+            <a:schemeClr val="accent1"/>
+          </a:effectRef>
+          <a:fontRef idx="minor">
+            <a:schemeClr val="lt1"/>
+          </a:fontRef>
+        </p:style>
+        <p:txBody>
+          <a:bodyPr lIns="0" tIns="0" rIns="0" bIns="0" rtlCol="0" anchor="ctr"/>
+          <a:lstStyle/>
+          <a:p>
+            <a:pPr algn="ctr"/>
+            <a:r>
+              <a:rPr lang="nb-NO" sz="1200" dirty="0" smtClean="0"/>
+              <a:t>E</a:t>
+            </a:r>
+            <a:endParaRPr lang="nb-NO" sz="1200" dirty="0"/>
+          </a:p>
+        </p:txBody>
+      </p:sp>
+      <p:sp>
+        <p:nvSpPr>
+          <p:cNvPr id="16" name="Ellipse 15"/>
+          <p:cNvSpPr/>
+          <p:nvPr/>
+        </p:nvSpPr>
+        <p:spPr>
+          <a:xfrm>
+            <a:off x="-642974" y="2143122"/>
+            <a:ext cx="214314" cy="214314"/>
+          </a:xfrm>
+          <a:prstGeom prst="ellipse">
+            <a:avLst/>
+          </a:prstGeom>
+          <a:solidFill>
+            <a:srgbClr val="C00000"/>
+          </a:solidFill>
+          <a:ln>
+            <a:solidFill>
+              <a:schemeClr val="tx1"/>
+            </a:solidFill>
+          </a:ln>
+        </p:spPr>
+        <p:style>
+          <a:lnRef idx="2">
+            <a:schemeClr val="accent1">
+              <a:shade val="50000"/>
+            </a:schemeClr>
+          </a:lnRef>
+          <a:fillRef idx="1">
+            <a:schemeClr val="accent1"/>
+          </a:fillRef>
+          <a:effectRef idx="0">
+            <a:schemeClr val="accent1"/>
+          </a:effectRef>
+          <a:fontRef idx="minor">
+            <a:schemeClr val="lt1"/>
+          </a:fontRef>
+        </p:style>
+        <p:txBody>
+          <a:bodyPr lIns="0" tIns="0" rIns="0" bIns="0" rtlCol="0" anchor="ctr"/>
+          <a:lstStyle/>
+          <a:p>
+            <a:pPr algn="ctr"/>
+            <a:r>
+              <a:rPr lang="nb-NO" sz="1200" dirty="0" smtClean="0"/>
+              <a:t>E</a:t>
+            </a:r>
+            <a:endParaRPr lang="nb-NO" sz="1200" dirty="0"/>
+          </a:p>
+        </p:txBody>
+      </p:sp>
+      <p:sp>
+        <p:nvSpPr>
+          <p:cNvPr id="17" name="Ellipse 16"/>
+          <p:cNvSpPr/>
+          <p:nvPr/>
+        </p:nvSpPr>
+        <p:spPr>
+          <a:xfrm>
+            <a:off x="-928726" y="2428874"/>
+            <a:ext cx="214314" cy="214314"/>
+          </a:xfrm>
+          <a:prstGeom prst="ellipse">
+            <a:avLst/>
+          </a:prstGeom>
+          <a:solidFill>
+            <a:srgbClr val="C00000"/>
+          </a:solidFill>
+          <a:ln>
+            <a:solidFill>
+              <a:schemeClr val="tx1"/>
+            </a:solidFill>
+          </a:ln>
+        </p:spPr>
+        <p:style>
+          <a:lnRef idx="2">
+            <a:schemeClr val="accent1">
+              <a:shade val="50000"/>
+            </a:schemeClr>
+          </a:lnRef>
+          <a:fillRef idx="1">
+            <a:schemeClr val="accent1"/>
+          </a:fillRef>
+          <a:effectRef idx="0">
+            <a:schemeClr val="accent1"/>
+          </a:effectRef>
+          <a:fontRef idx="minor">
+            <a:schemeClr val="lt1"/>
+          </a:fontRef>
+        </p:style>
+        <p:txBody>
+          <a:bodyPr lIns="0" tIns="0" rIns="0" bIns="0" rtlCol="0" anchor="ctr"/>
+          <a:lstStyle/>
+          <a:p>
+            <a:pPr algn="ctr"/>
+            <a:r>
+              <a:rPr lang="nb-NO" sz="1200" dirty="0" smtClean="0"/>
+              <a:t>F</a:t>
+            </a:r>
+            <a:endParaRPr lang="nb-NO" sz="1200" dirty="0"/>
+          </a:p>
+        </p:txBody>
+      </p:sp>
+      <p:sp>
+        <p:nvSpPr>
+          <p:cNvPr id="18" name="Ellipse 17"/>
+          <p:cNvSpPr/>
+          <p:nvPr/>
+        </p:nvSpPr>
+        <p:spPr>
+          <a:xfrm>
+            <a:off x="-642974" y="2428874"/>
+            <a:ext cx="214314" cy="214314"/>
+          </a:xfrm>
+          <a:prstGeom prst="ellipse">
+            <a:avLst/>
+          </a:prstGeom>
+          <a:solidFill>
+            <a:srgbClr val="C00000"/>
+          </a:solidFill>
+          <a:ln>
+            <a:solidFill>
+              <a:schemeClr val="tx1"/>
+            </a:solidFill>
+          </a:ln>
+        </p:spPr>
+        <p:style>
+          <a:lnRef idx="2">
+            <a:schemeClr val="accent1">
+              <a:shade val="50000"/>
+            </a:schemeClr>
+          </a:lnRef>
+          <a:fillRef idx="1">
+            <a:schemeClr val="accent1"/>
+          </a:fillRef>
+          <a:effectRef idx="0">
+            <a:schemeClr val="accent1"/>
+          </a:effectRef>
+          <a:fontRef idx="minor">
+            <a:schemeClr val="lt1"/>
+          </a:fontRef>
+        </p:style>
+        <p:txBody>
+          <a:bodyPr lIns="0" tIns="0" rIns="0" bIns="0" rtlCol="0" anchor="ctr"/>
+          <a:lstStyle/>
+          <a:p>
+            <a:pPr algn="ctr"/>
+            <a:r>
+              <a:rPr lang="nb-NO" sz="1200" dirty="0" smtClean="0"/>
+              <a:t>F</a:t>
+            </a:r>
+            <a:endParaRPr lang="nb-NO" sz="1200" dirty="0"/>
+          </a:p>
+        </p:txBody>
+      </p:sp>
+    </p:spTree>
+  </p:cSld>
+  <p:clrMapOvr>
+    <a:masterClrMapping/>
+  </p:clrMapOvr>
+  <p:timing>
+    <p:tnLst>
+      <p:par>
+        <p:cTn id="1" dur="indefinite" restart="never" nodeType="tmRoot"/>
+      </p:par>
+    </p:tnLst>
+  </p:timing>
+</p:sld>
+</file>
+
+<file path=ppt/slides/slide11.xml><?xml version="1.0" encoding="utf-8"?>
+<p:sld xmlns:a="http://schemas.openxmlformats.org/drawingml/2006/main" xmlns:r="http://schemas.openxmlformats.org/officeDocument/2006/relationships" xmlns:p="http://schemas.openxmlformats.org/presentationml/2006/main">
+  <p:cSld>
+    <p:spTree>
+      <p:nvGrpSpPr>
+        <p:cNvPr id="1" name=""/>
+        <p:cNvGrpSpPr/>
+        <p:nvPr/>
+      </p:nvGrpSpPr>
+      <p:grpSpPr>
+        <a:xfrm>
+          <a:off x="0" y="0"/>
+          <a:ext cx="0" cy="0"/>
+          <a:chOff x="0" y="0"/>
+          <a:chExt cx="0" cy="0"/>
+        </a:xfrm>
+      </p:grpSpPr>
+      <p:sp>
+        <p:nvSpPr>
+          <p:cNvPr id="2" name="Tittel 1"/>
+          <p:cNvSpPr>
+            <a:spLocks noGrp="1"/>
+          </p:cNvSpPr>
+          <p:nvPr>
+            <p:ph type="title"/>
+          </p:nvPr>
+        </p:nvSpPr>
+        <p:spPr/>
+        <p:txBody>
+          <a:bodyPr/>
+          <a:lstStyle/>
+          <a:p>
+            <a:r>
+              <a:rPr lang="en-US" dirty="0" smtClean="0"/>
               <a:t>INTELLIGENCE GAPS</a:t>
             </a:r>
             <a:endParaRPr lang="en-US" dirty="0"/>
@@ -5772,19 +6993,8 @@
                 <a:latin typeface="Arial" pitchFamily="34" charset="0"/>
                 <a:cs typeface="Arial" pitchFamily="34" charset="0"/>
               </a:rPr>
-              <a:t>This </a:t>
-            </a:r>
-            <a:r>
-              <a:rPr lang="nb-NO" sz="1400" dirty="0" smtClean="0">
-                <a:latin typeface="Arial" pitchFamily="34" charset="0"/>
-                <a:cs typeface="Arial" pitchFamily="34" charset="0"/>
-              </a:rPr>
-              <a:t>document describes how Syrian ground forces operate</a:t>
-            </a:r>
-            <a:endParaRPr lang="nb-NO" sz="1400" dirty="0" smtClean="0">
-              <a:latin typeface="Arial" pitchFamily="34" charset="0"/>
-              <a:cs typeface="Arial" pitchFamily="34" charset="0"/>
-            </a:endParaRPr>
+              <a:t>This document describes how Syrian ground forces operate</a:t>
+            </a:r>
           </a:p>
           <a:p>
             <a:endParaRPr lang="nb-NO" sz="1400" dirty="0" smtClean="0">
@@ -7458,14 +8668,7 @@
                 <a:latin typeface="Arial" pitchFamily="34" charset="0"/>
                 <a:cs typeface="Arial" pitchFamily="34" charset="0"/>
               </a:rPr>
-              <a:t>One of the frontal brigades will be designated as the Main Effort (ME). </a:t>
-            </a:r>
-            <a:r>
-              <a:rPr lang="nb-NO" sz="1100" dirty="0" smtClean="0">
-                <a:latin typeface="Arial" pitchFamily="34" charset="0"/>
-                <a:cs typeface="Arial" pitchFamily="34" charset="0"/>
-              </a:rPr>
-              <a:t>This brigade will have priority in receiving support from the division-level assets. As shown here, Front Brigade #1 is the ME and is supported by the division’s Rocket-ARTY BN.</a:t>
+              <a:t>One of the frontal brigades will be designated as the Main Effort (ME). This brigade will have priority in receiving support from the division-level assets. As shown here, Front Brigade #1 is the ME and is supported by the division’s Rocket-ARTY BN.</a:t>
             </a:r>
           </a:p>
           <a:p>
@@ -7485,10 +8688,6 @@
               </a:rPr>
               <a:t>A second BN of SA-8 will be close to the divisional Rocket-ARTY BN, defending it.</a:t>
             </a:r>
-            <a:endParaRPr lang="nb-NO" sz="1100" dirty="0" smtClean="0">
-              <a:latin typeface="Arial" pitchFamily="34" charset="0"/>
-              <a:cs typeface="Arial" pitchFamily="34" charset="0"/>
-            </a:endParaRPr>
           </a:p>
         </p:txBody>
       </p:sp>
@@ -8394,11 +9593,7 @@
           <a:p>
             <a:r>
               <a:rPr lang="en-US" dirty="0" smtClean="0"/>
-              <a:t>PHASES IN AN OFFENSIVE </a:t>
-            </a:r>
-            <a:r>
-              <a:rPr lang="en-US" dirty="0" smtClean="0"/>
-              <a:t>OPERATION: </a:t>
+              <a:t>PHASES IN AN OFFENSIVE OPERATION: </a:t>
             </a:r>
             <a:br>
               <a:rPr lang="en-US" dirty="0" smtClean="0"/>
@@ -9135,7 +10330,6 @@
               <a:rPr lang="nb-NO" dirty="0" smtClean="0"/>
               <a:t>Supply trucks in close vicinity</a:t>
             </a:r>
-            <a:endParaRPr lang="nb-NO" dirty="0" smtClean="0"/>
           </a:p>
           <a:p>
             <a:pPr marL="285750" indent="-285750">
@@ -9212,11 +10406,7 @@
           <a:p>
             <a:r>
               <a:rPr lang="en-US" dirty="0" smtClean="0"/>
-              <a:t>PHASES IN AN OFFENSIVE </a:t>
-            </a:r>
-            <a:r>
-              <a:rPr lang="en-US" dirty="0" smtClean="0"/>
-              <a:t>OPERATION: </a:t>
+              <a:t>PHASES IN AN OFFENSIVE OPERATION: </a:t>
             </a:r>
             <a:br>
               <a:rPr lang="en-US" dirty="0" smtClean="0"/>
@@ -9861,8 +11051,8 @@
         </p:nvSpPr>
         <p:spPr>
           <a:xfrm>
-            <a:off x="179512" y="1192753"/>
-            <a:ext cx="8496944" cy="3693319"/>
+            <a:off x="179512" y="1000114"/>
+            <a:ext cx="8496944" cy="4585871"/>
           </a:xfrm>
           <a:prstGeom prst="rect">
             <a:avLst/>
@@ -9876,22 +11066,23 @@
           <a:lstStyle/>
           <a:p>
             <a:r>
-              <a:rPr lang="nb-NO" b="1" dirty="0" smtClean="0"/>
+              <a:rPr lang="nb-NO" sz="1600" b="1" dirty="0" smtClean="0"/>
               <a:t>Purpose:</a:t>
             </a:r>
           </a:p>
           <a:p>
             <a:r>
-              <a:rPr lang="nb-NO" dirty="0" smtClean="0"/>
-              <a:t>Arrange combat units to required battle formation in preparation for the offensive</a:t>
-            </a:r>
-          </a:p>
-          <a:p>
-            <a:endParaRPr lang="nb-NO" dirty="0" smtClean="0"/>
-          </a:p>
-          <a:p>
-            <a:r>
-              <a:rPr lang="nb-NO" b="1" dirty="0" smtClean="0"/>
+              <a:rPr lang="nb-NO" sz="1600" dirty="0" smtClean="0"/>
+              <a:t>Shape the conditions in the battlefield to be in favor of the offensive force by hindering the enemy’s ability to counter the coming offensive.</a:t>
+            </a:r>
+            <a:endParaRPr lang="nb-NO" sz="1600" dirty="0" smtClean="0"/>
+          </a:p>
+          <a:p>
+            <a:endParaRPr lang="nb-NO" sz="1600" dirty="0" smtClean="0"/>
+          </a:p>
+          <a:p>
+            <a:r>
+              <a:rPr lang="nb-NO" sz="1600" b="1" dirty="0" smtClean="0"/>
               <a:t>Activity:</a:t>
             </a:r>
           </a:p>
@@ -9901,8 +11092,8 @@
               <a:buChar char="-"/>
             </a:pPr>
             <a:r>
-              <a:rPr lang="nb-NO" dirty="0" smtClean="0"/>
-              <a:t>Combat vehicles assuming stations consistent with the offensive-formation (2-front/1-rear)</a:t>
+              <a:rPr lang="nb-NO" sz="1600" dirty="0" smtClean="0"/>
+              <a:t>Artillery opens fire to harrass, suppress or destroy enemy positions such as observation-posts, command/control positions, communication sites, staging areas , artillery positions etc’</a:t>
             </a:r>
           </a:p>
           <a:p>
@@ -9911,8 +11102,17 @@
               <a:buChar char="-"/>
             </a:pPr>
             <a:r>
-              <a:rPr lang="nb-NO" dirty="0" smtClean="0"/>
-              <a:t>Logistic BN vehicles are falling back to the rear</a:t>
+              <a:rPr lang="nb-NO" sz="1600" dirty="0" smtClean="0"/>
+              <a:t>Insertion of special operation forces (SOFs) to deny the enemy of observation points, close roads and chockpoints which may be used by the enemy to move/resupply or reinforce his defending forces</a:t>
+            </a:r>
+          </a:p>
+          <a:p>
+            <a:endParaRPr lang="nb-NO" sz="1600" dirty="0" smtClean="0"/>
+          </a:p>
+          <a:p>
+            <a:r>
+              <a:rPr lang="nb-NO" sz="1600" b="1" dirty="0" smtClean="0"/>
+              <a:t>Indicators:</a:t>
             </a:r>
           </a:p>
           <a:p>
@@ -9921,18 +11121,8 @@
               <a:buChar char="-"/>
             </a:pPr>
             <a:r>
-              <a:rPr lang="nb-NO" dirty="0" smtClean="0"/>
-              <a:t>ARTY taking positions to be ready to provide fire support</a:t>
-            </a:r>
-            <a:endParaRPr lang="nb-NO" dirty="0" smtClean="0"/>
-          </a:p>
-          <a:p>
-            <a:endParaRPr lang="nb-NO" dirty="0" smtClean="0"/>
-          </a:p>
-          <a:p>
-            <a:r>
-              <a:rPr lang="nb-NO" b="1" dirty="0" smtClean="0"/>
-              <a:t>Indicators:</a:t>
+              <a:rPr lang="nb-NO" sz="1600" dirty="0" smtClean="0"/>
+              <a:t>Artillery fire falls sustained by units not currently involved in combat</a:t>
             </a:r>
           </a:p>
           <a:p>
@@ -9941,8 +11131,8 @@
               <a:buChar char="-"/>
             </a:pPr>
             <a:r>
-              <a:rPr lang="nb-NO" dirty="0" smtClean="0"/>
-              <a:t>Logistics vehicles moving to the rear of the division area</a:t>
+              <a:rPr lang="nb-NO" sz="1600" dirty="0" smtClean="0"/>
+              <a:t>Reports of rear units (convoys or staging areas) reporting being hit by artillery or ambush teams</a:t>
             </a:r>
           </a:p>
           <a:p>
@@ -9950,14 +11140,25 @@
               <a:buFontTx/>
               <a:buChar char="-"/>
             </a:pPr>
-            <a:endParaRPr lang="nb-NO" dirty="0" smtClean="0"/>
+            <a:r>
+              <a:rPr lang="nb-NO" sz="1600" dirty="0" smtClean="0"/>
+              <a:t>Loss of contact with observation posts (Suggesting either they’ve fallen to a raid by enemy SOFs or that the communications line have been severed by enemy artillery/SOF activity</a:t>
+            </a:r>
+            <a:endParaRPr lang="nb-NO" sz="1600" dirty="0" smtClean="0"/>
           </a:p>
           <a:p>
             <a:pPr marL="285750" indent="-285750">
               <a:buFontTx/>
               <a:buChar char="-"/>
             </a:pPr>
-            <a:endParaRPr lang="nb-NO" dirty="0" smtClean="0"/>
+            <a:endParaRPr lang="nb-NO" sz="1600" dirty="0" smtClean="0"/>
+          </a:p>
+          <a:p>
+            <a:pPr marL="285750" indent="-285750">
+              <a:buFontTx/>
+              <a:buChar char="-"/>
+            </a:pPr>
+            <a:endParaRPr lang="nb-NO" sz="1600" dirty="0" smtClean="0"/>
           </a:p>
         </p:txBody>
       </p:sp>
@@ -10008,14 +11209,26 @@
             <p:ph type="title"/>
           </p:nvPr>
         </p:nvSpPr>
-        <p:spPr/>
+        <p:spPr>
+          <a:xfrm>
+            <a:off x="-71438" y="339503"/>
+            <a:ext cx="9144000" cy="767768"/>
+          </a:xfrm>
+        </p:spPr>
         <p:txBody>
           <a:bodyPr/>
           <a:lstStyle/>
           <a:p>
             <a:r>
               <a:rPr lang="en-US" dirty="0" smtClean="0"/>
-              <a:t>DIVISION DEFENSIVE</a:t>
+              <a:t>PHASES IN AN OFFENSIVE OPERATION: </a:t>
+            </a:r>
+            <a:br>
+              <a:rPr lang="en-US" dirty="0" smtClean="0"/>
+            </a:br>
+            <a:r>
+              <a:rPr lang="en-US" dirty="0" smtClean="0"/>
+              <a:t>ASSAULT</a:t>
             </a:r>
             <a:endParaRPr lang="en-US" dirty="0"/>
           </a:p>
@@ -10645,7 +11858,157 @@
           </a:p>
         </p:txBody>
       </p:sp>
+      <p:sp>
+        <p:nvSpPr>
+          <p:cNvPr id="19" name="TekstSylinder 18"/>
+          <p:cNvSpPr txBox="1"/>
+          <p:nvPr/>
+        </p:nvSpPr>
+        <p:spPr>
+          <a:xfrm>
+            <a:off x="179512" y="1000114"/>
+            <a:ext cx="8496944" cy="3293209"/>
+          </a:xfrm>
+          <a:prstGeom prst="rect">
+            <a:avLst/>
+          </a:prstGeom>
+          <a:noFill/>
+        </p:spPr>
+        <p:txBody>
+          <a:bodyPr wrap="square" rtlCol="0">
+            <a:spAutoFit/>
+          </a:bodyPr>
+          <a:lstStyle/>
+          <a:p>
+            <a:r>
+              <a:rPr lang="nb-NO" sz="1600" b="1" dirty="0" smtClean="0"/>
+              <a:t>Purpose:</a:t>
+            </a:r>
+          </a:p>
+          <a:p>
+            <a:r>
+              <a:rPr lang="nb-NO" sz="1600" dirty="0" smtClean="0"/>
+              <a:t>Utilize the unit’s manuevering forces to achieve the objective of the offensive (territorial gain or tactical or strategic condition).</a:t>
+            </a:r>
+            <a:endParaRPr lang="nb-NO" sz="1600" dirty="0" smtClean="0"/>
+          </a:p>
+          <a:p>
+            <a:endParaRPr lang="nb-NO" sz="1600" dirty="0" smtClean="0"/>
+          </a:p>
+          <a:p>
+            <a:r>
+              <a:rPr lang="nb-NO" sz="1600" b="1" dirty="0" smtClean="0"/>
+              <a:t>Activity:</a:t>
+            </a:r>
+          </a:p>
+          <a:p>
+            <a:pPr marL="285750" indent="-285750">
+              <a:buFontTx/>
+              <a:buChar char="-"/>
+            </a:pPr>
+            <a:r>
+              <a:rPr lang="nb-NO" sz="1600" dirty="0" smtClean="0"/>
+              <a:t>Attack conducted by the a manuever by the division’s manuevering brigades</a:t>
+            </a:r>
+          </a:p>
+          <a:p>
+            <a:pPr marL="285750" indent="-285750">
+              <a:buFontTx/>
+              <a:buChar char="-"/>
+            </a:pPr>
+            <a:r>
+              <a:rPr lang="nb-NO" sz="1600" dirty="0" smtClean="0"/>
+              <a:t>Utilization of supporting assets such as artillery and air-support</a:t>
+            </a:r>
+          </a:p>
+          <a:p>
+            <a:endParaRPr lang="nb-NO" sz="1600" dirty="0" smtClean="0"/>
+          </a:p>
+          <a:p>
+            <a:r>
+              <a:rPr lang="nb-NO" sz="1600" b="1" dirty="0" smtClean="0"/>
+              <a:t>Indicators:</a:t>
+            </a:r>
+          </a:p>
+          <a:p>
+            <a:pPr marL="285750" indent="-285750">
+              <a:buFontTx/>
+              <a:buChar char="-"/>
+            </a:pPr>
+            <a:r>
+              <a:rPr lang="nb-NO" sz="1600" dirty="0" smtClean="0"/>
+              <a:t>Movement by some or all of the manuevering brigades pushing the FLOT</a:t>
+            </a:r>
+          </a:p>
+          <a:p>
+            <a:pPr marL="285750" indent="-285750">
+              <a:buFontTx/>
+              <a:buChar char="-"/>
+            </a:pPr>
+            <a:endParaRPr lang="nb-NO" sz="1600" dirty="0" smtClean="0"/>
+          </a:p>
+          <a:p>
+            <a:pPr marL="285750" indent="-285750">
+              <a:buFontTx/>
+              <a:buChar char="-"/>
+            </a:pPr>
+            <a:endParaRPr lang="nb-NO" sz="1600" dirty="0" smtClean="0"/>
+          </a:p>
+          <a:p>
+            <a:pPr marL="285750" indent="-285750">
+              <a:buFontTx/>
+              <a:buChar char="-"/>
+            </a:pPr>
+            <a:endParaRPr lang="nb-NO" sz="1600" dirty="0" smtClean="0"/>
+          </a:p>
+        </p:txBody>
+      </p:sp>
+      <p:sp>
+        <p:nvSpPr>
+          <p:cNvPr id="20" name="TekstSylinder 9"/>
+          <p:cNvSpPr txBox="1"/>
+          <p:nvPr/>
+        </p:nvSpPr>
+        <p:spPr>
+          <a:xfrm rot="18996742">
+            <a:off x="5420137" y="1745194"/>
+            <a:ext cx="2423186" cy="707886"/>
+          </a:xfrm>
+          <a:prstGeom prst="rect">
+            <a:avLst/>
+          </a:prstGeom>
+          <a:noFill/>
+        </p:spPr>
+        <p:txBody>
+          <a:bodyPr wrap="square" rtlCol="0">
+            <a:spAutoFit/>
+          </a:bodyPr>
+          <a:lstStyle/>
+          <a:p>
+            <a:r>
+              <a:rPr lang="en-US" sz="4000" b="1" dirty="0" smtClean="0">
+                <a:solidFill>
+                  <a:srgbClr val="FF0000"/>
+                </a:solidFill>
+                <a:latin typeface="Arial Black" pitchFamily="34" charset="0"/>
+              </a:rPr>
+              <a:t>DRAFT</a:t>
+            </a:r>
+            <a:endParaRPr lang="en-US" sz="4000" b="1" dirty="0">
+              <a:solidFill>
+                <a:srgbClr val="FF0000"/>
+              </a:solidFill>
+              <a:latin typeface="Arial Black" pitchFamily="34" charset="0"/>
+            </a:endParaRPr>
+          </a:p>
+        </p:txBody>
+      </p:sp>
     </p:spTree>
+    <p:extLst>
+      <p:ext uri="{BB962C8B-B14F-4D97-AF65-F5344CB8AC3E}">
+        <p14:creationId xmlns:p14="http://schemas.microsoft.com/office/powerpoint/2010/main" val="3349576044"/>
+      </p:ext>
+    </p:extLst>
   </p:cSld>
   <p:clrMapOvr>
     <a:masterClrMapping/>
@@ -10694,7 +12057,7 @@
           <a:p>
             <a:r>
               <a:rPr lang="en-US" dirty="0" smtClean="0"/>
-              <a:t>USE OF SHOCK BATTALIONS</a:t>
+              <a:t>DIVISION DEFENSIVE</a:t>
             </a:r>
             <a:endParaRPr lang="en-US" dirty="0"/>
           </a:p>
@@ -11373,550 +12736,9 @@
           <a:p>
             <a:r>
               <a:rPr lang="en-US" dirty="0" smtClean="0"/>
-              <a:t>INDICATORS</a:t>
+              <a:t>USE OF SHOCK BATTALIONS</a:t>
             </a:r>
             <a:endParaRPr lang="en-US" dirty="0"/>
-          </a:p>
-        </p:txBody>
-      </p:sp>
-      <p:sp>
-        <p:nvSpPr>
-          <p:cNvPr id="6" name="TekstSylinder 5"/>
-          <p:cNvSpPr txBox="1"/>
-          <p:nvPr/>
-        </p:nvSpPr>
-        <p:spPr>
-          <a:xfrm>
-            <a:off x="0" y="642924"/>
-            <a:ext cx="8786842" cy="4286280"/>
-          </a:xfrm>
-          <a:prstGeom prst="rect">
-            <a:avLst/>
-          </a:prstGeom>
-          <a:noFill/>
-          <a:ln>
-            <a:noFill/>
-          </a:ln>
-        </p:spPr>
-        <p:txBody>
-          <a:bodyPr wrap="square" rtlCol="0">
-            <a:normAutofit/>
-          </a:bodyPr>
-          <a:lstStyle/>
-          <a:p>
-            <a:pPr>
-              <a:buFont typeface="Arial" pitchFamily="34" charset="0"/>
-              <a:buChar char="•"/>
-            </a:pPr>
-            <a:r>
-              <a:rPr lang="nb-NO" sz="1200" dirty="0" smtClean="0"/>
-              <a:t>BM-21 </a:t>
-            </a:r>
-            <a:r>
-              <a:rPr lang="nb-NO" sz="1200" dirty="0" err="1" smtClean="0"/>
-              <a:t>launch</a:t>
-            </a:r>
-            <a:r>
-              <a:rPr lang="nb-NO" sz="1200" dirty="0" smtClean="0"/>
-              <a:t> or </a:t>
-            </a:r>
-            <a:r>
-              <a:rPr lang="nb-NO" sz="1200" dirty="0" err="1" smtClean="0"/>
-              <a:t>movement</a:t>
-            </a:r>
-            <a:r>
-              <a:rPr lang="nb-NO" sz="1200" dirty="0" smtClean="0"/>
-              <a:t> </a:t>
-            </a:r>
-            <a:r>
-              <a:rPr lang="nb-NO" sz="1200" dirty="0" err="1" smtClean="0"/>
-              <a:t>into</a:t>
-            </a:r>
-            <a:r>
-              <a:rPr lang="nb-NO" sz="1200" dirty="0" smtClean="0"/>
-              <a:t> firing </a:t>
-            </a:r>
-            <a:r>
-              <a:rPr lang="nb-NO" sz="1200" dirty="0" err="1" smtClean="0"/>
-              <a:t>positions</a:t>
-            </a:r>
-            <a:r>
-              <a:rPr lang="nb-NO" sz="1200" dirty="0" smtClean="0"/>
-              <a:t>. </a:t>
-            </a:r>
-          </a:p>
-          <a:p>
-            <a:pPr lvl="1">
-              <a:buFont typeface="Arial" pitchFamily="34" charset="0"/>
-              <a:buChar char="•"/>
-            </a:pPr>
-            <a:r>
-              <a:rPr lang="nb-NO" sz="1200" dirty="0" smtClean="0"/>
-              <a:t>Preparing offensive / </a:t>
-            </a:r>
-            <a:r>
-              <a:rPr lang="nb-NO" sz="1200" dirty="0" err="1" smtClean="0"/>
-              <a:t>Attack</a:t>
-            </a:r>
-            <a:endParaRPr lang="nb-NO" sz="1200" dirty="0" smtClean="0"/>
-          </a:p>
-          <a:p>
-            <a:pPr>
-              <a:buFont typeface="Arial" pitchFamily="34" charset="0"/>
-              <a:buChar char="•"/>
-            </a:pPr>
-            <a:r>
-              <a:rPr lang="nb-NO" sz="1200" dirty="0" smtClean="0"/>
-              <a:t>RW </a:t>
-            </a:r>
-            <a:r>
-              <a:rPr lang="nb-NO" sz="1200" dirty="0" err="1" smtClean="0"/>
-              <a:t>activity</a:t>
-            </a:r>
-            <a:r>
-              <a:rPr lang="nb-NO" sz="1200" dirty="0" smtClean="0"/>
-              <a:t> </a:t>
-            </a:r>
-            <a:r>
-              <a:rPr lang="nb-NO" sz="1200" dirty="0" err="1" smtClean="0"/>
-              <a:t>deep</a:t>
-            </a:r>
-            <a:r>
-              <a:rPr lang="nb-NO" sz="1200" dirty="0" smtClean="0"/>
-              <a:t> </a:t>
-            </a:r>
-            <a:r>
-              <a:rPr lang="nb-NO" sz="1200" dirty="0" err="1" smtClean="0"/>
-              <a:t>into</a:t>
-            </a:r>
-            <a:r>
-              <a:rPr lang="nb-NO" sz="1200" dirty="0" smtClean="0"/>
-              <a:t> </a:t>
-            </a:r>
-            <a:r>
-              <a:rPr lang="nb-NO" sz="1200" dirty="0" err="1" smtClean="0"/>
-              <a:t>enemy</a:t>
-            </a:r>
-            <a:r>
-              <a:rPr lang="nb-NO" sz="1200" dirty="0" smtClean="0"/>
-              <a:t> </a:t>
-            </a:r>
-            <a:r>
-              <a:rPr lang="nb-NO" sz="1200" dirty="0" err="1" smtClean="0"/>
-              <a:t>territory</a:t>
-            </a:r>
-            <a:endParaRPr lang="nb-NO" sz="1200" dirty="0" smtClean="0"/>
-          </a:p>
-          <a:p>
-            <a:pPr lvl="1">
-              <a:buFont typeface="Arial" pitchFamily="34" charset="0"/>
-              <a:buChar char="•"/>
-            </a:pPr>
-            <a:r>
-              <a:rPr lang="nb-NO" sz="1200" dirty="0" err="1" smtClean="0"/>
-              <a:t>Insertion</a:t>
-            </a:r>
-            <a:r>
-              <a:rPr lang="nb-NO" sz="1200" dirty="0" smtClean="0"/>
-              <a:t> </a:t>
-            </a:r>
-            <a:r>
-              <a:rPr lang="nb-NO" sz="1200" dirty="0" err="1" smtClean="0"/>
-              <a:t>of</a:t>
-            </a:r>
-            <a:r>
-              <a:rPr lang="nb-NO" sz="1200" dirty="0" smtClean="0"/>
-              <a:t> Long Range </a:t>
-            </a:r>
-            <a:r>
-              <a:rPr lang="nb-NO" sz="1200" dirty="0" err="1" smtClean="0"/>
-              <a:t>Recon</a:t>
-            </a:r>
-            <a:endParaRPr lang="nb-NO" sz="1200" dirty="0" smtClean="0"/>
-          </a:p>
-          <a:p>
-            <a:pPr>
-              <a:buFont typeface="Arial" pitchFamily="34" charset="0"/>
-              <a:buChar char="•"/>
-            </a:pPr>
-            <a:r>
-              <a:rPr lang="nb-NO" sz="1200" dirty="0" smtClean="0"/>
-              <a:t>FW (transport) </a:t>
-            </a:r>
-            <a:r>
-              <a:rPr lang="nb-NO" sz="1200" dirty="0" err="1" smtClean="0"/>
-              <a:t>activity</a:t>
-            </a:r>
-            <a:r>
-              <a:rPr lang="nb-NO" sz="1200" dirty="0" smtClean="0"/>
-              <a:t> </a:t>
-            </a:r>
-            <a:r>
-              <a:rPr lang="nb-NO" sz="1200" dirty="0" err="1" smtClean="0"/>
-              <a:t>deep</a:t>
-            </a:r>
-            <a:r>
-              <a:rPr lang="nb-NO" sz="1200" dirty="0" smtClean="0"/>
-              <a:t> </a:t>
-            </a:r>
-            <a:r>
-              <a:rPr lang="nb-NO" sz="1200" dirty="0" err="1" smtClean="0"/>
-              <a:t>into</a:t>
-            </a:r>
-            <a:r>
-              <a:rPr lang="nb-NO" sz="1200" dirty="0" smtClean="0"/>
-              <a:t> </a:t>
-            </a:r>
-            <a:r>
-              <a:rPr lang="nb-NO" sz="1200" dirty="0" err="1" smtClean="0"/>
-              <a:t>enemy</a:t>
-            </a:r>
-            <a:r>
-              <a:rPr lang="nb-NO" sz="1200" dirty="0" smtClean="0"/>
-              <a:t> </a:t>
-            </a:r>
-            <a:r>
-              <a:rPr lang="nb-NO" sz="1200" dirty="0" err="1" smtClean="0"/>
-              <a:t>territory</a:t>
-            </a:r>
-            <a:endParaRPr lang="nb-NO" sz="1200" dirty="0" smtClean="0"/>
-          </a:p>
-          <a:p>
-            <a:pPr lvl="1">
-              <a:buFont typeface="Arial" pitchFamily="34" charset="0"/>
-              <a:buChar char="•"/>
-            </a:pPr>
-            <a:r>
-              <a:rPr lang="nb-NO" sz="1200" dirty="0" err="1" smtClean="0"/>
-              <a:t>Airborne</a:t>
-            </a:r>
-            <a:r>
-              <a:rPr lang="nb-NO" sz="1200" dirty="0" smtClean="0"/>
-              <a:t> </a:t>
-            </a:r>
-            <a:r>
-              <a:rPr lang="nb-NO" sz="1200" dirty="0" err="1" smtClean="0"/>
-              <a:t>Assault</a:t>
-            </a:r>
-            <a:r>
-              <a:rPr lang="nb-NO" sz="1200" dirty="0" smtClean="0"/>
-              <a:t> ( </a:t>
-            </a:r>
-            <a:r>
-              <a:rPr lang="nb-NO" sz="1200" dirty="0" err="1" smtClean="0"/>
-              <a:t>Many</a:t>
-            </a:r>
-            <a:r>
-              <a:rPr lang="nb-NO" sz="1200" dirty="0" smtClean="0"/>
-              <a:t> FW transports)</a:t>
-            </a:r>
-          </a:p>
-          <a:p>
-            <a:pPr lvl="1">
-              <a:buFont typeface="Arial" pitchFamily="34" charset="0"/>
-              <a:buChar char="•"/>
-            </a:pPr>
-            <a:r>
-              <a:rPr lang="nb-NO" sz="1200" dirty="0" smtClean="0"/>
-              <a:t>Long range </a:t>
-            </a:r>
-            <a:r>
-              <a:rPr lang="nb-NO" sz="1200" dirty="0" err="1" smtClean="0"/>
-              <a:t>Recon</a:t>
-            </a:r>
-            <a:r>
-              <a:rPr lang="nb-NO" sz="1200" dirty="0" smtClean="0"/>
-              <a:t> ( </a:t>
-            </a:r>
-            <a:r>
-              <a:rPr lang="nb-NO" sz="1200" dirty="0" err="1" smtClean="0"/>
-              <a:t>If</a:t>
-            </a:r>
-            <a:r>
-              <a:rPr lang="nb-NO" sz="1200" dirty="0" smtClean="0"/>
-              <a:t> </a:t>
-            </a:r>
-            <a:r>
-              <a:rPr lang="nb-NO" sz="1200" dirty="0" err="1" smtClean="0"/>
-              <a:t>only</a:t>
-            </a:r>
-            <a:r>
-              <a:rPr lang="nb-NO" sz="1200" dirty="0" smtClean="0"/>
-              <a:t> a single AC is in </a:t>
-            </a:r>
-            <a:r>
-              <a:rPr lang="nb-NO" sz="1200" dirty="0" err="1" smtClean="0"/>
-              <a:t>use</a:t>
-            </a:r>
-            <a:r>
-              <a:rPr lang="nb-NO" sz="1200" dirty="0" smtClean="0"/>
-              <a:t>, or flying </a:t>
-            </a:r>
-            <a:r>
-              <a:rPr lang="nb-NO" sz="1200" dirty="0" err="1" smtClean="0"/>
-              <a:t>tactical</a:t>
-            </a:r>
-            <a:r>
-              <a:rPr lang="nb-NO" sz="1200" dirty="0" smtClean="0"/>
-              <a:t>, </a:t>
-            </a:r>
-            <a:r>
-              <a:rPr lang="nb-NO" sz="1200" dirty="0" err="1" smtClean="0"/>
-              <a:t>low</a:t>
-            </a:r>
-            <a:r>
-              <a:rPr lang="nb-NO" sz="1200" dirty="0" smtClean="0"/>
-              <a:t> </a:t>
-            </a:r>
-            <a:r>
-              <a:rPr lang="nb-NO" sz="1200" dirty="0" err="1" smtClean="0"/>
-              <a:t>level</a:t>
-            </a:r>
-            <a:r>
-              <a:rPr lang="nb-NO" sz="1200" dirty="0" smtClean="0"/>
-              <a:t>)</a:t>
-            </a:r>
-          </a:p>
-          <a:p>
-            <a:pPr>
-              <a:buFont typeface="Arial" pitchFamily="34" charset="0"/>
-              <a:buChar char="•"/>
-            </a:pPr>
-            <a:r>
-              <a:rPr lang="nb-NO" sz="1200" dirty="0" err="1" smtClean="0"/>
-              <a:t>Artillery</a:t>
-            </a:r>
-            <a:r>
-              <a:rPr lang="nb-NO" sz="1200" dirty="0" smtClean="0"/>
-              <a:t> at a </a:t>
-            </a:r>
-            <a:r>
-              <a:rPr lang="nb-NO" sz="1200" dirty="0" err="1" smtClean="0"/>
-              <a:t>certain</a:t>
-            </a:r>
-            <a:r>
-              <a:rPr lang="nb-NO" sz="1200" dirty="0" smtClean="0"/>
-              <a:t> </a:t>
-            </a:r>
-            <a:r>
-              <a:rPr lang="nb-NO" sz="1200" dirty="0" err="1" smtClean="0"/>
-              <a:t>point</a:t>
-            </a:r>
-            <a:r>
-              <a:rPr lang="nb-NO" sz="1200" dirty="0" smtClean="0"/>
-              <a:t> (</a:t>
-            </a:r>
-            <a:r>
-              <a:rPr lang="nb-NO" sz="1200" dirty="0" err="1" smtClean="0"/>
-              <a:t>point</a:t>
-            </a:r>
-            <a:r>
-              <a:rPr lang="nb-NO" sz="1200" dirty="0" smtClean="0"/>
-              <a:t> target)</a:t>
-            </a:r>
-          </a:p>
-          <a:p>
-            <a:pPr lvl="1">
-              <a:buFont typeface="Arial" pitchFamily="34" charset="0"/>
-              <a:buChar char="•"/>
-            </a:pPr>
-            <a:r>
-              <a:rPr lang="nb-NO" sz="1200" dirty="0" err="1" smtClean="0"/>
-              <a:t>Trying</a:t>
-            </a:r>
-            <a:r>
-              <a:rPr lang="nb-NO" sz="1200" dirty="0" smtClean="0"/>
-              <a:t> to kill the target</a:t>
-            </a:r>
-          </a:p>
-          <a:p>
-            <a:pPr>
-              <a:buFont typeface="Arial" pitchFamily="34" charset="0"/>
-              <a:buChar char="•"/>
-            </a:pPr>
-            <a:r>
-              <a:rPr lang="nb-NO" sz="1200" dirty="0" err="1" smtClean="0"/>
-              <a:t>Artillery</a:t>
-            </a:r>
-            <a:r>
-              <a:rPr lang="nb-NO" sz="1200" dirty="0" smtClean="0"/>
-              <a:t> at an area</a:t>
-            </a:r>
-          </a:p>
-          <a:p>
-            <a:pPr lvl="1">
-              <a:buFont typeface="Arial" pitchFamily="34" charset="0"/>
-              <a:buChar char="•"/>
-            </a:pPr>
-            <a:r>
-              <a:rPr lang="nb-NO" sz="1200" dirty="0" err="1" smtClean="0"/>
-              <a:t>Suppression</a:t>
-            </a:r>
-            <a:r>
-              <a:rPr lang="nb-NO" sz="1200" dirty="0" smtClean="0"/>
-              <a:t>, to cover for </a:t>
-            </a:r>
-            <a:r>
-              <a:rPr lang="nb-NO" sz="1200" dirty="0" err="1" smtClean="0"/>
-              <a:t>movement</a:t>
-            </a:r>
-            <a:r>
-              <a:rPr lang="nb-NO" sz="1200" dirty="0" smtClean="0"/>
-              <a:t> / </a:t>
-            </a:r>
-            <a:r>
-              <a:rPr lang="nb-NO" sz="1200" dirty="0" err="1" smtClean="0"/>
-              <a:t>attack</a:t>
-            </a:r>
-            <a:endParaRPr lang="nb-NO" sz="1200" dirty="0" smtClean="0"/>
-          </a:p>
-          <a:p>
-            <a:pPr>
-              <a:buFont typeface="Arial" pitchFamily="34" charset="0"/>
-              <a:buChar char="•"/>
-            </a:pPr>
-            <a:r>
-              <a:rPr lang="nb-NO" sz="1200" dirty="0" smtClean="0"/>
-              <a:t>Fill </a:t>
-            </a:r>
-            <a:r>
-              <a:rPr lang="nb-NO" sz="1200" dirty="0" err="1" smtClean="0"/>
-              <a:t>out</a:t>
-            </a:r>
-            <a:r>
-              <a:rPr lang="nb-NO" sz="1200" dirty="0" smtClean="0"/>
-              <a:t> </a:t>
-            </a:r>
-            <a:r>
-              <a:rPr lang="nb-NO" sz="1200" dirty="0" err="1" smtClean="0"/>
-              <a:t>many</a:t>
-            </a:r>
-            <a:r>
-              <a:rPr lang="nb-NO" sz="1200" dirty="0" smtClean="0"/>
-              <a:t> more…..</a:t>
-            </a:r>
-          </a:p>
-          <a:p>
-            <a:pPr>
-              <a:buFont typeface="Arial" pitchFamily="34" charset="0"/>
-              <a:buChar char="•"/>
-            </a:pPr>
-            <a:endParaRPr lang="nb-NO" sz="1200" dirty="0" smtClean="0"/>
-          </a:p>
-          <a:p>
-            <a:pPr>
-              <a:buFont typeface="Arial" pitchFamily="34" charset="0"/>
-              <a:buChar char="•"/>
-            </a:pPr>
-            <a:r>
-              <a:rPr lang="nb-NO" sz="1200" dirty="0" err="1" smtClean="0"/>
-              <a:t>Artillery</a:t>
-            </a:r>
-            <a:r>
-              <a:rPr lang="nb-NO" sz="1200" dirty="0" smtClean="0"/>
-              <a:t> </a:t>
-            </a:r>
-            <a:r>
-              <a:rPr lang="nb-NO" sz="1200" dirty="0" err="1" smtClean="0"/>
-              <a:t>units</a:t>
-            </a:r>
-            <a:r>
-              <a:rPr lang="nb-NO" sz="1200" dirty="0" smtClean="0"/>
-              <a:t> in firing </a:t>
-            </a:r>
-            <a:r>
-              <a:rPr lang="nb-NO" sz="1200" dirty="0" err="1" smtClean="0"/>
-              <a:t>position</a:t>
-            </a:r>
-            <a:r>
-              <a:rPr lang="nb-NO" sz="1200" dirty="0" smtClean="0"/>
-              <a:t> (</a:t>
-            </a:r>
-            <a:r>
-              <a:rPr lang="nb-NO" sz="1200" dirty="0" err="1" smtClean="0"/>
-              <a:t>spread</a:t>
-            </a:r>
-            <a:r>
-              <a:rPr lang="nb-NO" sz="1200" dirty="0" smtClean="0"/>
-              <a:t> </a:t>
-            </a:r>
-            <a:r>
-              <a:rPr lang="nb-NO" sz="1200" dirty="0" err="1" smtClean="0"/>
-              <a:t>out</a:t>
-            </a:r>
-            <a:r>
-              <a:rPr lang="nb-NO" sz="1200" dirty="0" smtClean="0"/>
-              <a:t>, IAW a </a:t>
-            </a:r>
-            <a:r>
-              <a:rPr lang="nb-NO" sz="1200" dirty="0" err="1" smtClean="0"/>
-              <a:t>template</a:t>
-            </a:r>
-            <a:r>
-              <a:rPr lang="nb-NO" sz="1200" dirty="0" smtClean="0"/>
-              <a:t>)</a:t>
-            </a:r>
-          </a:p>
-          <a:p>
-            <a:pPr>
-              <a:buFont typeface="Arial" pitchFamily="34" charset="0"/>
-              <a:buChar char="•"/>
-            </a:pPr>
-            <a:r>
-              <a:rPr lang="nb-NO" sz="1200" dirty="0" smtClean="0"/>
-              <a:t>General </a:t>
-            </a:r>
-            <a:r>
-              <a:rPr lang="nb-NO" sz="1200" dirty="0" err="1" smtClean="0"/>
-              <a:t>convoy</a:t>
-            </a:r>
-            <a:r>
-              <a:rPr lang="nb-NO" sz="1200" dirty="0" smtClean="0"/>
-              <a:t> </a:t>
-            </a:r>
-            <a:r>
-              <a:rPr lang="nb-NO" sz="1200" dirty="0" err="1" smtClean="0"/>
-              <a:t>movement</a:t>
-            </a:r>
-            <a:endParaRPr lang="nb-NO" sz="1200" dirty="0" smtClean="0"/>
-          </a:p>
-          <a:p>
-            <a:pPr lvl="1">
-              <a:buFont typeface="Arial" pitchFamily="34" charset="0"/>
-              <a:buChar char="•"/>
-            </a:pPr>
-            <a:r>
-              <a:rPr lang="nb-NO" sz="1200" dirty="0" err="1" smtClean="0"/>
-              <a:t>Upcoming</a:t>
-            </a:r>
-            <a:r>
-              <a:rPr lang="nb-NO" sz="1200" dirty="0" smtClean="0"/>
-              <a:t> action (offensive), in a </a:t>
-            </a:r>
-            <a:r>
-              <a:rPr lang="nb-NO" sz="1200" dirty="0" err="1" smtClean="0"/>
-              <a:t>certian</a:t>
-            </a:r>
-            <a:r>
-              <a:rPr lang="nb-NO" sz="1200" dirty="0" smtClean="0"/>
-              <a:t> </a:t>
-            </a:r>
-            <a:r>
-              <a:rPr lang="nb-NO" sz="1200" dirty="0" err="1" smtClean="0"/>
-              <a:t>amount</a:t>
-            </a:r>
-            <a:r>
-              <a:rPr lang="nb-NO" sz="1200" dirty="0" smtClean="0"/>
-              <a:t> </a:t>
-            </a:r>
-            <a:r>
-              <a:rPr lang="nb-NO" sz="1200" dirty="0" err="1" smtClean="0"/>
-              <a:t>of</a:t>
-            </a:r>
-            <a:r>
-              <a:rPr lang="nb-NO" sz="1200" dirty="0" smtClean="0"/>
-              <a:t> time</a:t>
-            </a:r>
           </a:p>
         </p:txBody>
       </p:sp>

</xml_diff>

<commit_message>
chg: Neck added some comments to Intrep OPAR 001- Syrian ground combat tactics
</commit_message>
<xml_diff>
--- a/OPAR/INTREP VIS OPAR-001 - Syrian ground combat tactics.pptx
+++ b/OPAR/INTREP VIS OPAR-001 - Syrian ground combat tactics.pptx
@@ -203,7 +203,7 @@
             <a:fld id="{40637A30-8EE1-4060-9976-8832FC89EE34}" type="datetimeFigureOut">
               <a:rPr lang="nb-NO" smtClean="0"/>
               <a:pPr/>
-              <a:t>31.07.2020</a:t>
+              <a:t>02.08.2020</a:t>
             </a:fld>
             <a:endParaRPr lang="nb-NO"/>
           </a:p>
@@ -374,7 +374,7 @@
     </p:spTree>
     <p:extLst>
       <p:ext uri="{BB962C8B-B14F-4D97-AF65-F5344CB8AC3E}">
-        <p14:creationId xmlns:p14="http://schemas.microsoft.com/office/powerpoint/2010/main" val="2256331300"/>
+        <p14:creationId xmlns:p14="http://schemas.microsoft.com/office/powerpoint/2010/main" xmlns="" val="2256331300"/>
       </p:ext>
     </p:extLst>
   </p:cSld>
@@ -8691,10 +8691,61 @@
           </a:p>
         </p:txBody>
       </p:sp>
+      <p:sp>
+        <p:nvSpPr>
+          <p:cNvPr id="32" name="TekstSylinder 31"/>
+          <p:cNvSpPr txBox="1"/>
+          <p:nvPr/>
+        </p:nvSpPr>
+        <p:spPr>
+          <a:xfrm>
+            <a:off x="5903640" y="0"/>
+            <a:ext cx="3240360" cy="646331"/>
+          </a:xfrm>
+          <a:prstGeom prst="rect">
+            <a:avLst/>
+          </a:prstGeom>
+          <a:solidFill>
+            <a:schemeClr val="bg1"/>
+          </a:solidFill>
+          <a:ln w="38100">
+            <a:solidFill>
+              <a:srgbClr val="C00000"/>
+            </a:solidFill>
+          </a:ln>
+        </p:spPr>
+        <p:txBody>
+          <a:bodyPr wrap="square" rtlCol="0">
+            <a:spAutoFit/>
+          </a:bodyPr>
+          <a:lstStyle/>
+          <a:p>
+            <a:r>
+              <a:rPr lang="en-US" sz="1200" b="1" u="sng" dirty="0" smtClean="0"/>
+              <a:t>COMMENT NECK, 2</a:t>
+            </a:r>
+            <a:r>
+              <a:rPr lang="en-US" sz="1200" b="1" u="sng" baseline="30000" dirty="0" smtClean="0"/>
+              <a:t>nd</a:t>
+            </a:r>
+            <a:r>
+              <a:rPr lang="en-US" sz="1200" b="1" u="sng" dirty="0" smtClean="0"/>
+              <a:t> August:</a:t>
+            </a:r>
+          </a:p>
+          <a:p>
+            <a:r>
+              <a:rPr lang="en-US" sz="1200" dirty="0" smtClean="0"/>
+              <a:t>Need to look into Arty BN, think they may be a part of the brigades</a:t>
+            </a:r>
+            <a:endParaRPr lang="en-US" sz="1200" dirty="0"/>
+          </a:p>
+        </p:txBody>
+      </p:sp>
     </p:spTree>
     <p:extLst>
       <p:ext uri="{BB962C8B-B14F-4D97-AF65-F5344CB8AC3E}">
-        <p14:creationId xmlns:p14="http://schemas.microsoft.com/office/powerpoint/2010/main" val="1177541819"/>
+        <p14:creationId xmlns:p14="http://schemas.microsoft.com/office/powerpoint/2010/main" xmlns="" val="1177541819"/>
       </p:ext>
     </p:extLst>
   </p:cSld>
@@ -10347,10 +10398,61 @@
           </a:p>
         </p:txBody>
       </p:sp>
+      <p:sp>
+        <p:nvSpPr>
+          <p:cNvPr id="20" name="TekstSylinder 19"/>
+          <p:cNvSpPr txBox="1"/>
+          <p:nvPr/>
+        </p:nvSpPr>
+        <p:spPr>
+          <a:xfrm>
+            <a:off x="5903640" y="0"/>
+            <a:ext cx="3240360" cy="830997"/>
+          </a:xfrm>
+          <a:prstGeom prst="rect">
+            <a:avLst/>
+          </a:prstGeom>
+          <a:solidFill>
+            <a:schemeClr val="bg1"/>
+          </a:solidFill>
+          <a:ln w="38100">
+            <a:solidFill>
+              <a:srgbClr val="C00000"/>
+            </a:solidFill>
+          </a:ln>
+        </p:spPr>
+        <p:txBody>
+          <a:bodyPr wrap="square" rtlCol="0">
+            <a:spAutoFit/>
+          </a:bodyPr>
+          <a:lstStyle/>
+          <a:p>
+            <a:r>
+              <a:rPr lang="en-US" sz="1200" b="1" u="sng" dirty="0" smtClean="0"/>
+              <a:t>COMMENT NECK, 2</a:t>
+            </a:r>
+            <a:r>
+              <a:rPr lang="en-US" sz="1200" b="1" u="sng" baseline="30000" dirty="0" smtClean="0"/>
+              <a:t>nd</a:t>
+            </a:r>
+            <a:r>
+              <a:rPr lang="en-US" sz="1200" b="1" u="sng" dirty="0" smtClean="0"/>
+              <a:t> August:</a:t>
+            </a:r>
+          </a:p>
+          <a:p>
+            <a:r>
+              <a:rPr lang="en-US" sz="1200" dirty="0" smtClean="0"/>
+              <a:t>Should include some timings, so that both we as mission designers, but also VIS then can make assessment when things will take place next.</a:t>
+            </a:r>
+            <a:endParaRPr lang="en-US" sz="1200" dirty="0"/>
+          </a:p>
+        </p:txBody>
+      </p:sp>
     </p:spTree>
     <p:extLst>
       <p:ext uri="{BB962C8B-B14F-4D97-AF65-F5344CB8AC3E}">
-        <p14:creationId xmlns:p14="http://schemas.microsoft.com/office/powerpoint/2010/main" val="390204938"/>
+        <p14:creationId xmlns:p14="http://schemas.microsoft.com/office/powerpoint/2010/main" xmlns="" val="390204938"/>
       </p:ext>
     </p:extLst>
   </p:cSld>
@@ -11075,7 +11177,6 @@
               <a:rPr lang="nb-NO" sz="1600" dirty="0" smtClean="0"/>
               <a:t>Shape the conditions in the battlefield to be in favor of the offensive force by hindering the enemy’s ability to counter the coming offensive.</a:t>
             </a:r>
-            <a:endParaRPr lang="nb-NO" sz="1600" dirty="0" smtClean="0"/>
           </a:p>
           <a:p>
             <a:endParaRPr lang="nb-NO" sz="1600" dirty="0" smtClean="0"/>
@@ -11144,7 +11245,6 @@
               <a:rPr lang="nb-NO" sz="1600" dirty="0" smtClean="0"/>
               <a:t>Loss of contact with observation posts (Suggesting either they’ve fallen to a raid by enemy SOFs or that the communications line have been severed by enemy artillery/SOF activity</a:t>
             </a:r>
-            <a:endParaRPr lang="nb-NO" sz="1600" dirty="0" smtClean="0"/>
           </a:p>
           <a:p>
             <a:pPr marL="285750" indent="-285750">
@@ -11162,10 +11262,61 @@
           </a:p>
         </p:txBody>
       </p:sp>
+      <p:sp>
+        <p:nvSpPr>
+          <p:cNvPr id="20" name="TekstSylinder 19"/>
+          <p:cNvSpPr txBox="1"/>
+          <p:nvPr/>
+        </p:nvSpPr>
+        <p:spPr>
+          <a:xfrm>
+            <a:off x="5903640" y="0"/>
+            <a:ext cx="3240360" cy="830997"/>
+          </a:xfrm>
+          <a:prstGeom prst="rect">
+            <a:avLst/>
+          </a:prstGeom>
+          <a:solidFill>
+            <a:schemeClr val="bg1"/>
+          </a:solidFill>
+          <a:ln w="38100">
+            <a:solidFill>
+              <a:srgbClr val="C00000"/>
+            </a:solidFill>
+          </a:ln>
+        </p:spPr>
+        <p:txBody>
+          <a:bodyPr wrap="square" rtlCol="0">
+            <a:spAutoFit/>
+          </a:bodyPr>
+          <a:lstStyle/>
+          <a:p>
+            <a:r>
+              <a:rPr lang="en-US" sz="1200" b="1" u="sng" dirty="0" smtClean="0"/>
+              <a:t>COMMENT NECK, 2</a:t>
+            </a:r>
+            <a:r>
+              <a:rPr lang="en-US" sz="1200" b="1" u="sng" baseline="30000" dirty="0" smtClean="0"/>
+              <a:t>nd</a:t>
+            </a:r>
+            <a:r>
+              <a:rPr lang="en-US" sz="1200" b="1" u="sng" dirty="0" smtClean="0"/>
+              <a:t> August:</a:t>
+            </a:r>
+          </a:p>
+          <a:p>
+            <a:r>
+              <a:rPr lang="en-US" sz="1200" dirty="0" smtClean="0"/>
+              <a:t>Should include some timings, so that both we as mission designers, but also VIS then can make assessment when things will take place next.</a:t>
+            </a:r>
+            <a:endParaRPr lang="en-US" sz="1200" dirty="0"/>
+          </a:p>
+        </p:txBody>
+      </p:sp>
     </p:spTree>
     <p:extLst>
       <p:ext uri="{BB962C8B-B14F-4D97-AF65-F5344CB8AC3E}">
-        <p14:creationId xmlns:p14="http://schemas.microsoft.com/office/powerpoint/2010/main" val="4063869597"/>
+        <p14:creationId xmlns:p14="http://schemas.microsoft.com/office/powerpoint/2010/main" xmlns="" val="4063869597"/>
       </p:ext>
     </p:extLst>
   </p:cSld>
@@ -11890,7 +12041,6 @@
               <a:rPr lang="nb-NO" sz="1600" dirty="0" smtClean="0"/>
               <a:t>Utilize the unit’s manuevering forces to achieve the objective of the offensive (territorial gain or tactical or strategic condition).</a:t>
             </a:r>
-            <a:endParaRPr lang="nb-NO" sz="1600" dirty="0" smtClean="0"/>
           </a:p>
           <a:p>
             <a:endParaRPr lang="nb-NO" sz="1600" dirty="0" smtClean="0"/>
@@ -12006,7 +12156,7 @@
     </p:spTree>
     <p:extLst>
       <p:ext uri="{BB962C8B-B14F-4D97-AF65-F5344CB8AC3E}">
-        <p14:creationId xmlns:p14="http://schemas.microsoft.com/office/powerpoint/2010/main" val="3349576044"/>
+        <p14:creationId xmlns:p14="http://schemas.microsoft.com/office/powerpoint/2010/main" xmlns="" val="3349576044"/>
       </p:ext>
     </p:extLst>
   </p:cSld>

</xml_diff>

<commit_message>
Added content to slides
</commit_message>
<xml_diff>
--- a/OPAR/INTREP VIS OPAR-001 - Syrian ground combat tactics.pptx
+++ b/OPAR/INTREP VIS OPAR-001 - Syrian ground combat tactics.pptx
@@ -203,7 +203,7 @@
             <a:fld id="{40637A30-8EE1-4060-9976-8832FC89EE34}" type="datetimeFigureOut">
               <a:rPr lang="nb-NO" smtClean="0"/>
               <a:pPr/>
-              <a:t>31.07.2020</a:t>
+              <a:t>28.08.2020</a:t>
             </a:fld>
             <a:endParaRPr lang="nb-NO"/>
           </a:p>
@@ -4291,40 +4291,8 @@
               <a:buChar char="•"/>
             </a:pPr>
             <a:r>
-              <a:rPr lang="nb-NO" sz="1200" dirty="0" smtClean="0"/>
-              <a:t>BM-21 </a:t>
-            </a:r>
-            <a:r>
-              <a:rPr lang="nb-NO" sz="1200" dirty="0" err="1" smtClean="0"/>
-              <a:t>launch</a:t>
-            </a:r>
-            <a:r>
-              <a:rPr lang="nb-NO" sz="1200" dirty="0" smtClean="0"/>
-              <a:t> or </a:t>
-            </a:r>
-            <a:r>
-              <a:rPr lang="nb-NO" sz="1200" dirty="0" err="1" smtClean="0"/>
-              <a:t>movement</a:t>
-            </a:r>
-            <a:r>
-              <a:rPr lang="nb-NO" sz="1200" dirty="0" smtClean="0"/>
-              <a:t> </a:t>
-            </a:r>
-            <a:r>
-              <a:rPr lang="nb-NO" sz="1200" dirty="0" err="1" smtClean="0"/>
-              <a:t>into</a:t>
-            </a:r>
-            <a:r>
-              <a:rPr lang="nb-NO" sz="1200" dirty="0" smtClean="0"/>
-              <a:t> firing </a:t>
-            </a:r>
-            <a:r>
-              <a:rPr lang="nb-NO" sz="1200" dirty="0" err="1" smtClean="0"/>
-              <a:t>positions</a:t>
-            </a:r>
-            <a:r>
-              <a:rPr lang="nb-NO" sz="1200" dirty="0" smtClean="0"/>
-              <a:t>. </a:t>
+              <a:rPr lang="nb-NO" sz="1200" dirty="0"/>
+              <a:t>BM-21 launch or movement into firing positions. </a:t>
             </a:r>
           </a:p>
           <a:p>
@@ -4333,14 +4301,9 @@
               <a:buChar char="•"/>
             </a:pPr>
             <a:r>
-              <a:rPr lang="nb-NO" sz="1200" dirty="0" smtClean="0"/>
-              <a:t>Preparing offensive / </a:t>
-            </a:r>
-            <a:r>
-              <a:rPr lang="nb-NO" sz="1200" dirty="0" err="1" smtClean="0"/>
-              <a:t>Attack</a:t>
-            </a:r>
-            <a:endParaRPr lang="nb-NO" sz="1200" dirty="0" smtClean="0"/>
+              <a:rPr lang="nb-NO" sz="1200" dirty="0"/>
+              <a:t>Preparing offensive / Attack</a:t>
+            </a:r>
           </a:p>
           <a:p>
             <a:pPr>
@@ -4348,46 +4311,9 @@
               <a:buChar char="•"/>
             </a:pPr>
             <a:r>
-              <a:rPr lang="nb-NO" sz="1200" dirty="0" smtClean="0"/>
-              <a:t>RW </a:t>
-            </a:r>
-            <a:r>
-              <a:rPr lang="nb-NO" sz="1200" dirty="0" err="1" smtClean="0"/>
-              <a:t>activity</a:t>
-            </a:r>
-            <a:r>
-              <a:rPr lang="nb-NO" sz="1200" dirty="0" smtClean="0"/>
-              <a:t> </a:t>
-            </a:r>
-            <a:r>
-              <a:rPr lang="nb-NO" sz="1200" dirty="0" err="1" smtClean="0"/>
-              <a:t>deep</a:t>
-            </a:r>
-            <a:r>
-              <a:rPr lang="nb-NO" sz="1200" dirty="0" smtClean="0"/>
-              <a:t> </a:t>
-            </a:r>
-            <a:r>
-              <a:rPr lang="nb-NO" sz="1200" dirty="0" err="1" smtClean="0"/>
-              <a:t>into</a:t>
-            </a:r>
-            <a:r>
-              <a:rPr lang="nb-NO" sz="1200" dirty="0" smtClean="0"/>
-              <a:t> </a:t>
-            </a:r>
-            <a:r>
-              <a:rPr lang="nb-NO" sz="1200" dirty="0" err="1" smtClean="0"/>
-              <a:t>enemy</a:t>
-            </a:r>
-            <a:r>
-              <a:rPr lang="nb-NO" sz="1200" dirty="0" smtClean="0"/>
-              <a:t> </a:t>
-            </a:r>
-            <a:r>
-              <a:rPr lang="nb-NO" sz="1200" dirty="0" err="1" smtClean="0"/>
-              <a:t>territory</a:t>
-            </a:r>
-            <a:endParaRPr lang="nb-NO" sz="1200" dirty="0" smtClean="0"/>
+              <a:rPr lang="nb-NO" sz="1200" dirty="0"/>
+              <a:t>RW activity deep into enemy territory</a:t>
+            </a:r>
           </a:p>
           <a:p>
             <a:pPr lvl="1">
@@ -4395,26 +4321,9 @@
               <a:buChar char="•"/>
             </a:pPr>
             <a:r>
-              <a:rPr lang="nb-NO" sz="1200" dirty="0" err="1" smtClean="0"/>
-              <a:t>Insertion</a:t>
-            </a:r>
-            <a:r>
-              <a:rPr lang="nb-NO" sz="1200" dirty="0" smtClean="0"/>
-              <a:t> </a:t>
-            </a:r>
-            <a:r>
-              <a:rPr lang="nb-NO" sz="1200" dirty="0" err="1" smtClean="0"/>
-              <a:t>of</a:t>
-            </a:r>
-            <a:r>
-              <a:rPr lang="nb-NO" sz="1200" dirty="0" smtClean="0"/>
-              <a:t> Long Range </a:t>
-            </a:r>
-            <a:r>
-              <a:rPr lang="nb-NO" sz="1200" dirty="0" err="1" smtClean="0"/>
-              <a:t>Recon</a:t>
-            </a:r>
-            <a:endParaRPr lang="nb-NO" sz="1200" dirty="0" smtClean="0"/>
+              <a:rPr lang="nb-NO" sz="1200" dirty="0"/>
+              <a:t>Insertion of Long Range Recon</a:t>
+            </a:r>
           </a:p>
           <a:p>
             <a:pPr>
@@ -4422,46 +4331,9 @@
               <a:buChar char="•"/>
             </a:pPr>
             <a:r>
-              <a:rPr lang="nb-NO" sz="1200" dirty="0" smtClean="0"/>
-              <a:t>FW (transport) </a:t>
-            </a:r>
-            <a:r>
-              <a:rPr lang="nb-NO" sz="1200" dirty="0" err="1" smtClean="0"/>
-              <a:t>activity</a:t>
-            </a:r>
-            <a:r>
-              <a:rPr lang="nb-NO" sz="1200" dirty="0" smtClean="0"/>
-              <a:t> </a:t>
-            </a:r>
-            <a:r>
-              <a:rPr lang="nb-NO" sz="1200" dirty="0" err="1" smtClean="0"/>
-              <a:t>deep</a:t>
-            </a:r>
-            <a:r>
-              <a:rPr lang="nb-NO" sz="1200" dirty="0" smtClean="0"/>
-              <a:t> </a:t>
-            </a:r>
-            <a:r>
-              <a:rPr lang="nb-NO" sz="1200" dirty="0" err="1" smtClean="0"/>
-              <a:t>into</a:t>
-            </a:r>
-            <a:r>
-              <a:rPr lang="nb-NO" sz="1200" dirty="0" smtClean="0"/>
-              <a:t> </a:t>
-            </a:r>
-            <a:r>
-              <a:rPr lang="nb-NO" sz="1200" dirty="0" err="1" smtClean="0"/>
-              <a:t>enemy</a:t>
-            </a:r>
-            <a:r>
-              <a:rPr lang="nb-NO" sz="1200" dirty="0" smtClean="0"/>
-              <a:t> </a:t>
-            </a:r>
-            <a:r>
-              <a:rPr lang="nb-NO" sz="1200" dirty="0" err="1" smtClean="0"/>
-              <a:t>territory</a:t>
-            </a:r>
-            <a:endParaRPr lang="nb-NO" sz="1200" dirty="0" smtClean="0"/>
+              <a:rPr lang="nb-NO" sz="1200" dirty="0"/>
+              <a:t>FW (transport) activity deep into enemy territory</a:t>
+            </a:r>
           </a:p>
           <a:p>
             <a:pPr lvl="1">
@@ -4469,28 +4341,8 @@
               <a:buChar char="•"/>
             </a:pPr>
             <a:r>
-              <a:rPr lang="nb-NO" sz="1200" dirty="0" err="1" smtClean="0"/>
-              <a:t>Airborne</a:t>
-            </a:r>
-            <a:r>
-              <a:rPr lang="nb-NO" sz="1200" dirty="0" smtClean="0"/>
-              <a:t> </a:t>
-            </a:r>
-            <a:r>
-              <a:rPr lang="nb-NO" sz="1200" dirty="0" err="1" smtClean="0"/>
-              <a:t>Assault</a:t>
-            </a:r>
-            <a:r>
-              <a:rPr lang="nb-NO" sz="1200" dirty="0" smtClean="0"/>
-              <a:t> ( </a:t>
-            </a:r>
-            <a:r>
-              <a:rPr lang="nb-NO" sz="1200" dirty="0" err="1" smtClean="0"/>
-              <a:t>Many</a:t>
-            </a:r>
-            <a:r>
-              <a:rPr lang="nb-NO" sz="1200" dirty="0" smtClean="0"/>
-              <a:t> FW transports)</a:t>
+              <a:rPr lang="nb-NO" sz="1200" dirty="0"/>
+              <a:t>Airborne Assault ( Many FW transports)</a:t>
             </a:r>
           </a:p>
           <a:p>
@@ -4499,64 +4351,8 @@
               <a:buChar char="•"/>
             </a:pPr>
             <a:r>
-              <a:rPr lang="nb-NO" sz="1200" dirty="0" smtClean="0"/>
-              <a:t>Long range </a:t>
-            </a:r>
-            <a:r>
-              <a:rPr lang="nb-NO" sz="1200" dirty="0" err="1" smtClean="0"/>
-              <a:t>Recon</a:t>
-            </a:r>
-            <a:r>
-              <a:rPr lang="nb-NO" sz="1200" dirty="0" smtClean="0"/>
-              <a:t> ( </a:t>
-            </a:r>
-            <a:r>
-              <a:rPr lang="nb-NO" sz="1200" dirty="0" err="1" smtClean="0"/>
-              <a:t>If</a:t>
-            </a:r>
-            <a:r>
-              <a:rPr lang="nb-NO" sz="1200" dirty="0" smtClean="0"/>
-              <a:t> </a:t>
-            </a:r>
-            <a:r>
-              <a:rPr lang="nb-NO" sz="1200" dirty="0" err="1" smtClean="0"/>
-              <a:t>only</a:t>
-            </a:r>
-            <a:r>
-              <a:rPr lang="nb-NO" sz="1200" dirty="0" smtClean="0"/>
-              <a:t> a single AC is in </a:t>
-            </a:r>
-            <a:r>
-              <a:rPr lang="nb-NO" sz="1200" dirty="0" err="1" smtClean="0"/>
-              <a:t>use</a:t>
-            </a:r>
-            <a:r>
-              <a:rPr lang="nb-NO" sz="1200" dirty="0" smtClean="0"/>
-              <a:t>, or flying </a:t>
-            </a:r>
-            <a:r>
-              <a:rPr lang="nb-NO" sz="1200" dirty="0" err="1" smtClean="0"/>
-              <a:t>tactical</a:t>
-            </a:r>
-            <a:r>
-              <a:rPr lang="nb-NO" sz="1200" dirty="0" smtClean="0"/>
-              <a:t>, </a:t>
-            </a:r>
-            <a:r>
-              <a:rPr lang="nb-NO" sz="1200" dirty="0" err="1" smtClean="0"/>
-              <a:t>low</a:t>
-            </a:r>
-            <a:r>
-              <a:rPr lang="nb-NO" sz="1200" dirty="0" smtClean="0"/>
-              <a:t> </a:t>
-            </a:r>
-            <a:r>
-              <a:rPr lang="nb-NO" sz="1200" dirty="0" err="1" smtClean="0"/>
-              <a:t>level</a:t>
-            </a:r>
-            <a:r>
-              <a:rPr lang="nb-NO" sz="1200" dirty="0" smtClean="0"/>
-              <a:t>)</a:t>
+              <a:rPr lang="nb-NO" sz="1200" dirty="0"/>
+              <a:t>Long range Recon ( If only a single AC is in use, or flying tactical, low level)</a:t>
             </a:r>
           </a:p>
           <a:p>
@@ -4565,36 +4361,8 @@
               <a:buChar char="•"/>
             </a:pPr>
             <a:r>
-              <a:rPr lang="nb-NO" sz="1200" dirty="0" err="1" smtClean="0"/>
-              <a:t>Artillery</a:t>
-            </a:r>
-            <a:r>
-              <a:rPr lang="nb-NO" sz="1200" dirty="0" smtClean="0"/>
-              <a:t> at a </a:t>
-            </a:r>
-            <a:r>
-              <a:rPr lang="nb-NO" sz="1200" dirty="0" err="1" smtClean="0"/>
-              <a:t>certain</a:t>
-            </a:r>
-            <a:r>
-              <a:rPr lang="nb-NO" sz="1200" dirty="0" smtClean="0"/>
-              <a:t> </a:t>
-            </a:r>
-            <a:r>
-              <a:rPr lang="nb-NO" sz="1200" dirty="0" err="1" smtClean="0"/>
-              <a:t>point</a:t>
-            </a:r>
-            <a:r>
-              <a:rPr lang="nb-NO" sz="1200" dirty="0" smtClean="0"/>
-              <a:t> (</a:t>
-            </a:r>
-            <a:r>
-              <a:rPr lang="nb-NO" sz="1200" dirty="0" err="1" smtClean="0"/>
-              <a:t>point</a:t>
-            </a:r>
-            <a:r>
-              <a:rPr lang="nb-NO" sz="1200" dirty="0" smtClean="0"/>
-              <a:t> target)</a:t>
+              <a:rPr lang="nb-NO" sz="1200" dirty="0"/>
+              <a:t>Artillery at a certain point (point target)</a:t>
             </a:r>
           </a:p>
           <a:p>
@@ -4603,12 +4371,8 @@
               <a:buChar char="•"/>
             </a:pPr>
             <a:r>
-              <a:rPr lang="nb-NO" sz="1200" dirty="0" err="1" smtClean="0"/>
-              <a:t>Trying</a:t>
-            </a:r>
-            <a:r>
-              <a:rPr lang="nb-NO" sz="1200" dirty="0" smtClean="0"/>
-              <a:t> to kill the target</a:t>
+              <a:rPr lang="nb-NO" sz="1200" dirty="0"/>
+              <a:t>Trying to kill the target</a:t>
             </a:r>
           </a:p>
           <a:p>
@@ -4617,12 +4381,8 @@
               <a:buChar char="•"/>
             </a:pPr>
             <a:r>
-              <a:rPr lang="nb-NO" sz="1200" dirty="0" err="1" smtClean="0"/>
-              <a:t>Artillery</a:t>
-            </a:r>
-            <a:r>
-              <a:rPr lang="nb-NO" sz="1200" dirty="0" smtClean="0"/>
-              <a:t> at an area</a:t>
+              <a:rPr lang="nb-NO" sz="1200" dirty="0"/>
+              <a:t>Artillery at an area</a:t>
             </a:r>
           </a:p>
           <a:p>
@@ -4631,51 +4391,45 @@
               <a:buChar char="•"/>
             </a:pPr>
             <a:r>
-              <a:rPr lang="nb-NO" sz="1200" dirty="0" err="1" smtClean="0"/>
-              <a:t>Suppression</a:t>
-            </a:r>
-            <a:r>
-              <a:rPr lang="nb-NO" sz="1200" dirty="0" smtClean="0"/>
-              <a:t>, to cover for </a:t>
-            </a:r>
-            <a:r>
-              <a:rPr lang="nb-NO" sz="1200" dirty="0" err="1" smtClean="0"/>
-              <a:t>movement</a:t>
-            </a:r>
-            <a:r>
-              <a:rPr lang="nb-NO" sz="1200" dirty="0" smtClean="0"/>
-              <a:t> / </a:t>
-            </a:r>
-            <a:r>
-              <a:rPr lang="nb-NO" sz="1200" dirty="0" err="1" smtClean="0"/>
-              <a:t>attack</a:t>
-            </a:r>
-            <a:endParaRPr lang="nb-NO" sz="1200" dirty="0" smtClean="0"/>
+              <a:rPr lang="nb-NO" sz="1200" dirty="0"/>
+              <a:t>Suppression, to cover for movement / attack</a:t>
+            </a:r>
           </a:p>
           <a:p>
             <a:pPr>
               <a:buFont typeface="Arial" pitchFamily="34" charset="0"/>
               <a:buChar char="•"/>
             </a:pPr>
-            <a:r>
-              <a:rPr lang="nb-NO" sz="1200" dirty="0" smtClean="0"/>
-              <a:t>Fill </a:t>
-            </a:r>
-            <a:r>
-              <a:rPr lang="nb-NO" sz="1200" dirty="0" err="1" smtClean="0"/>
-              <a:t>out</a:t>
-            </a:r>
-            <a:r>
-              <a:rPr lang="nb-NO" sz="1200" dirty="0" smtClean="0"/>
-              <a:t> </a:t>
-            </a:r>
-            <a:r>
-              <a:rPr lang="nb-NO" sz="1200" dirty="0" err="1" smtClean="0"/>
-              <a:t>many</a:t>
-            </a:r>
-            <a:r>
-              <a:rPr lang="nb-NO" sz="1200" dirty="0" smtClean="0"/>
-              <a:t> more…..</a:t>
+            <a:endParaRPr lang="nb-NO" sz="1200" dirty="0"/>
+          </a:p>
+          <a:p>
+            <a:pPr>
+              <a:buFont typeface="Arial" pitchFamily="34" charset="0"/>
+              <a:buChar char="•"/>
+            </a:pPr>
+            <a:r>
+              <a:rPr lang="nb-NO" sz="1200" dirty="0"/>
+              <a:t>Artillery units in firing position (spread out, IAW a template)</a:t>
+            </a:r>
+          </a:p>
+          <a:p>
+            <a:pPr>
+              <a:buFont typeface="Arial" pitchFamily="34" charset="0"/>
+              <a:buChar char="•"/>
+            </a:pPr>
+            <a:r>
+              <a:rPr lang="nb-NO" sz="1200" dirty="0"/>
+              <a:t>General convoy movement</a:t>
+            </a:r>
+          </a:p>
+          <a:p>
+            <a:pPr lvl="1">
+              <a:buFont typeface="Arial" pitchFamily="34" charset="0"/>
+              <a:buChar char="•"/>
+            </a:pPr>
+            <a:r>
+              <a:rPr lang="nb-NO" sz="1200" dirty="0"/>
+              <a:t>Upcoming action (offensive), in a certian amount of time</a:t>
             </a:r>
           </a:p>
           <a:p>
@@ -4690,115 +4444,7 @@
               <a:buFont typeface="Arial" pitchFamily="34" charset="0"/>
               <a:buChar char="•"/>
             </a:pPr>
-            <a:r>
-              <a:rPr lang="nb-NO" sz="1200" dirty="0" err="1" smtClean="0"/>
-              <a:t>Artillery</a:t>
-            </a:r>
-            <a:r>
-              <a:rPr lang="nb-NO" sz="1200" dirty="0" smtClean="0"/>
-              <a:t> </a:t>
-            </a:r>
-            <a:r>
-              <a:rPr lang="nb-NO" sz="1200" dirty="0" err="1" smtClean="0"/>
-              <a:t>units</a:t>
-            </a:r>
-            <a:r>
-              <a:rPr lang="nb-NO" sz="1200" dirty="0" smtClean="0"/>
-              <a:t> in firing </a:t>
-            </a:r>
-            <a:r>
-              <a:rPr lang="nb-NO" sz="1200" dirty="0" err="1" smtClean="0"/>
-              <a:t>position</a:t>
-            </a:r>
-            <a:r>
-              <a:rPr lang="nb-NO" sz="1200" dirty="0" smtClean="0"/>
-              <a:t> (</a:t>
-            </a:r>
-            <a:r>
-              <a:rPr lang="nb-NO" sz="1200" dirty="0" err="1" smtClean="0"/>
-              <a:t>spread</a:t>
-            </a:r>
-            <a:r>
-              <a:rPr lang="nb-NO" sz="1200" dirty="0" smtClean="0"/>
-              <a:t> </a:t>
-            </a:r>
-            <a:r>
-              <a:rPr lang="nb-NO" sz="1200" dirty="0" err="1" smtClean="0"/>
-              <a:t>out</a:t>
-            </a:r>
-            <a:r>
-              <a:rPr lang="nb-NO" sz="1200" dirty="0" smtClean="0"/>
-              <a:t>, IAW a </a:t>
-            </a:r>
-            <a:r>
-              <a:rPr lang="nb-NO" sz="1200" dirty="0" err="1" smtClean="0"/>
-              <a:t>template</a:t>
-            </a:r>
-            <a:r>
-              <a:rPr lang="nb-NO" sz="1200" dirty="0" smtClean="0"/>
-              <a:t>)</a:t>
-            </a:r>
-          </a:p>
-          <a:p>
-            <a:pPr>
-              <a:buFont typeface="Arial" pitchFamily="34" charset="0"/>
-              <a:buChar char="•"/>
-            </a:pPr>
-            <a:r>
-              <a:rPr lang="nb-NO" sz="1200" dirty="0" smtClean="0"/>
-              <a:t>General </a:t>
-            </a:r>
-            <a:r>
-              <a:rPr lang="nb-NO" sz="1200" dirty="0" err="1" smtClean="0"/>
-              <a:t>convoy</a:t>
-            </a:r>
-            <a:r>
-              <a:rPr lang="nb-NO" sz="1200" dirty="0" smtClean="0"/>
-              <a:t> </a:t>
-            </a:r>
-            <a:r>
-              <a:rPr lang="nb-NO" sz="1200" dirty="0" err="1" smtClean="0"/>
-              <a:t>movement</a:t>
-            </a:r>
             <a:endParaRPr lang="nb-NO" sz="1200" dirty="0" smtClean="0"/>
-          </a:p>
-          <a:p>
-            <a:pPr lvl="1">
-              <a:buFont typeface="Arial" pitchFamily="34" charset="0"/>
-              <a:buChar char="•"/>
-            </a:pPr>
-            <a:r>
-              <a:rPr lang="nb-NO" sz="1200" dirty="0" err="1" smtClean="0"/>
-              <a:t>Upcoming</a:t>
-            </a:r>
-            <a:r>
-              <a:rPr lang="nb-NO" sz="1200" dirty="0" smtClean="0"/>
-              <a:t> action (offensive), in a </a:t>
-            </a:r>
-            <a:r>
-              <a:rPr lang="nb-NO" sz="1200" dirty="0" err="1" smtClean="0"/>
-              <a:t>certian</a:t>
-            </a:r>
-            <a:r>
-              <a:rPr lang="nb-NO" sz="1200" dirty="0" smtClean="0"/>
-              <a:t> </a:t>
-            </a:r>
-            <a:r>
-              <a:rPr lang="nb-NO" sz="1200" dirty="0" err="1" smtClean="0"/>
-              <a:t>amount</a:t>
-            </a:r>
-            <a:r>
-              <a:rPr lang="nb-NO" sz="1200" dirty="0" smtClean="0"/>
-              <a:t> </a:t>
-            </a:r>
-            <a:r>
-              <a:rPr lang="nb-NO" sz="1200" dirty="0" err="1" smtClean="0"/>
-              <a:t>of</a:t>
-            </a:r>
-            <a:r>
-              <a:rPr lang="nb-NO" sz="1200" dirty="0" smtClean="0"/>
-              <a:t> time</a:t>
-            </a:r>
           </a:p>
         </p:txBody>
       </p:sp>
@@ -5423,6 +5069,46 @@
               <a:t>F</a:t>
             </a:r>
             <a:endParaRPr lang="nb-NO" sz="1200" dirty="0"/>
+          </a:p>
+        </p:txBody>
+      </p:sp>
+      <p:sp>
+        <p:nvSpPr>
+          <p:cNvPr id="19" name="TekstSylinder 9"/>
+          <p:cNvSpPr txBox="1"/>
+          <p:nvPr/>
+        </p:nvSpPr>
+        <p:spPr>
+          <a:xfrm rot="18996742">
+            <a:off x="4143482" y="1722033"/>
+            <a:ext cx="4374292" cy="1323439"/>
+          </a:xfrm>
+          <a:prstGeom prst="rect">
+            <a:avLst/>
+          </a:prstGeom>
+          <a:noFill/>
+        </p:spPr>
+        <p:txBody>
+          <a:bodyPr wrap="square" rtlCol="0">
+            <a:spAutoFit/>
+          </a:bodyPr>
+          <a:lstStyle/>
+          <a:p>
+            <a:r>
+              <a:rPr lang="en-US" sz="4000" b="1" dirty="0" smtClean="0">
+                <a:solidFill>
+                  <a:srgbClr val="FF0000"/>
+                </a:solidFill>
+                <a:latin typeface="Arial Black" pitchFamily="34" charset="0"/>
+              </a:rPr>
+              <a:t>DRAFT (Redundant?)</a:t>
+            </a:r>
+            <a:endParaRPr lang="en-US" sz="4000" b="1" dirty="0">
+              <a:solidFill>
+                <a:srgbClr val="FF0000"/>
+              </a:solidFill>
+              <a:latin typeface="Arial Black" pitchFamily="34" charset="0"/>
+            </a:endParaRPr>
           </a:p>
         </p:txBody>
       </p:sp>
@@ -5568,81 +5254,15 @@
               <a:buChar char="-"/>
             </a:pPr>
             <a:r>
-              <a:rPr lang="nb-NO" sz="1200" dirty="0" err="1" smtClean="0"/>
-              <a:t>Provide</a:t>
-            </a:r>
-            <a:r>
-              <a:rPr lang="nb-NO" sz="1200" dirty="0" smtClean="0"/>
-              <a:t> a list </a:t>
-            </a:r>
-            <a:r>
-              <a:rPr lang="nb-NO" sz="1200" dirty="0" err="1" smtClean="0"/>
-              <a:t>of</a:t>
-            </a:r>
-            <a:r>
-              <a:rPr lang="nb-NO" sz="1200" dirty="0" smtClean="0"/>
-              <a:t> </a:t>
-            </a:r>
-            <a:r>
-              <a:rPr lang="nb-NO" sz="1200" dirty="0" err="1" smtClean="0"/>
-              <a:t>questions</a:t>
-            </a:r>
-            <a:r>
-              <a:rPr lang="nb-NO" sz="1200" dirty="0" smtClean="0"/>
-              <a:t> or gaps in </a:t>
-            </a:r>
-            <a:r>
-              <a:rPr lang="nb-NO" sz="1200" dirty="0" err="1" smtClean="0"/>
-              <a:t>intelligence</a:t>
-            </a:r>
-            <a:r>
-              <a:rPr lang="nb-NO" sz="1200" dirty="0" smtClean="0"/>
-              <a:t>, </a:t>
-            </a:r>
-            <a:r>
-              <a:rPr lang="nb-NO" sz="1200" dirty="0" err="1" smtClean="0"/>
-              <a:t>where</a:t>
-            </a:r>
-            <a:r>
-              <a:rPr lang="nb-NO" sz="1200" dirty="0" smtClean="0"/>
-              <a:t> </a:t>
-            </a:r>
-            <a:r>
-              <a:rPr lang="nb-NO" sz="1200" dirty="0" err="1" smtClean="0"/>
-              <a:t>taskings</a:t>
-            </a:r>
-            <a:r>
-              <a:rPr lang="nb-NO" sz="1200" dirty="0" smtClean="0"/>
-              <a:t> </a:t>
-            </a:r>
-            <a:r>
-              <a:rPr lang="nb-NO" sz="1200" dirty="0" err="1" smtClean="0"/>
-              <a:t>can</a:t>
-            </a:r>
-            <a:r>
-              <a:rPr lang="nb-NO" sz="1200" dirty="0" smtClean="0"/>
-              <a:t> be </a:t>
-            </a:r>
-            <a:r>
-              <a:rPr lang="nb-NO" sz="1200" dirty="0" err="1" smtClean="0"/>
-              <a:t>generated</a:t>
-            </a:r>
-            <a:r>
-              <a:rPr lang="nb-NO" sz="1200" dirty="0" smtClean="0"/>
-              <a:t> to </a:t>
-            </a:r>
-            <a:r>
-              <a:rPr lang="nb-NO" sz="1200" dirty="0" err="1" smtClean="0"/>
-              <a:t>collect</a:t>
-            </a:r>
-            <a:r>
-              <a:rPr lang="nb-NO" sz="1200" dirty="0" smtClean="0"/>
-              <a:t> </a:t>
-            </a:r>
-            <a:r>
-              <a:rPr lang="nb-NO" sz="1200" dirty="0" err="1" smtClean="0"/>
-              <a:t>information</a:t>
-            </a:r>
+              <a:rPr lang="nb-NO" sz="1200" dirty="0"/>
+              <a:t>Provide a list of questions or gaps in intelligence, where taskings can be generated to collect information</a:t>
+            </a:r>
+          </a:p>
+          <a:p>
+            <a:pPr>
+              <a:buFontTx/>
+              <a:buChar char="-"/>
+            </a:pPr>
             <a:endParaRPr lang="nb-NO" sz="1200" dirty="0"/>
           </a:p>
         </p:txBody>
@@ -8688,6 +8308,46 @@
               </a:rPr>
               <a:t>A second BN of SA-8 will be close to the divisional Rocket-ARTY BN, defending it.</a:t>
             </a:r>
+          </a:p>
+        </p:txBody>
+      </p:sp>
+      <p:sp>
+        <p:nvSpPr>
+          <p:cNvPr id="32" name="TekstSylinder 9"/>
+          <p:cNvSpPr txBox="1"/>
+          <p:nvPr/>
+        </p:nvSpPr>
+        <p:spPr>
+          <a:xfrm rot="18996742">
+            <a:off x="5420137" y="1745194"/>
+            <a:ext cx="2423186" cy="707886"/>
+          </a:xfrm>
+          <a:prstGeom prst="rect">
+            <a:avLst/>
+          </a:prstGeom>
+          <a:noFill/>
+        </p:spPr>
+        <p:txBody>
+          <a:bodyPr wrap="square" rtlCol="0">
+            <a:spAutoFit/>
+          </a:bodyPr>
+          <a:lstStyle/>
+          <a:p>
+            <a:r>
+              <a:rPr lang="en-US" sz="4000" b="1" dirty="0" smtClean="0">
+                <a:solidFill>
+                  <a:srgbClr val="FF0000"/>
+                </a:solidFill>
+                <a:latin typeface="Arial Black" pitchFamily="34" charset="0"/>
+              </a:rPr>
+              <a:t>DRAFT</a:t>
+            </a:r>
+            <a:endParaRPr lang="en-US" sz="4000" b="1" dirty="0">
+              <a:solidFill>
+                <a:srgbClr val="FF0000"/>
+              </a:solidFill>
+              <a:latin typeface="Arial Black" pitchFamily="34" charset="0"/>
+            </a:endParaRPr>
           </a:p>
         </p:txBody>
       </p:sp>
@@ -9397,145 +9057,114 @@
           </a:bodyPr>
           <a:lstStyle/>
           <a:p>
-            <a:r>
-              <a:rPr lang="nb-NO" dirty="0" err="1" smtClean="0"/>
+            <a:pPr marL="285750" indent="-285750">
+              <a:buFont typeface="Arial" panose="020B0604020202020204" pitchFamily="34" charset="0"/>
+              <a:buChar char="•"/>
+            </a:pPr>
+            <a:r>
+              <a:rPr lang="nb-NO" dirty="0" smtClean="0"/>
               <a:t>Resupply</a:t>
             </a:r>
-            <a:endParaRPr lang="nb-NO" dirty="0" smtClean="0"/>
-          </a:p>
-          <a:p>
+          </a:p>
+          <a:p>
+            <a:pPr marL="285750" indent="-285750">
+              <a:buFont typeface="Arial" panose="020B0604020202020204" pitchFamily="34" charset="0"/>
+              <a:buChar char="•"/>
+            </a:pPr>
             <a:r>
               <a:rPr lang="nb-NO" dirty="0" smtClean="0"/>
               <a:t>Staging</a:t>
             </a:r>
           </a:p>
           <a:p>
-            <a:r>
-              <a:rPr lang="nb-NO" dirty="0" err="1" smtClean="0"/>
+            <a:pPr marL="285750" indent="-285750">
+              <a:buFont typeface="Arial" panose="020B0604020202020204" pitchFamily="34" charset="0"/>
+              <a:buChar char="•"/>
+            </a:pPr>
+            <a:r>
+              <a:rPr lang="nb-NO" dirty="0" smtClean="0"/>
               <a:t>Shaping</a:t>
             </a:r>
+          </a:p>
+          <a:p>
+            <a:pPr marL="285750" indent="-285750">
+              <a:buFont typeface="Arial" panose="020B0604020202020204" pitchFamily="34" charset="0"/>
+              <a:buChar char="•"/>
+            </a:pPr>
+            <a:r>
+              <a:rPr lang="nb-NO" dirty="0" smtClean="0"/>
+              <a:t>Assault</a:t>
+            </a:r>
+          </a:p>
+          <a:p>
+            <a:pPr marL="285750" indent="-285750">
+              <a:buFont typeface="Arial" panose="020B0604020202020204" pitchFamily="34" charset="0"/>
+              <a:buChar char="•"/>
+            </a:pPr>
+            <a:r>
+              <a:rPr lang="nb-NO" dirty="0" smtClean="0"/>
+              <a:t>Transition into defensive</a:t>
+            </a:r>
+          </a:p>
+          <a:p>
+            <a:pPr marL="285750" indent="-285750">
+              <a:buFont typeface="Arial" panose="020B0604020202020204" pitchFamily="34" charset="0"/>
+              <a:buChar char="•"/>
+            </a:pPr>
+            <a:r>
+              <a:rPr lang="nb-NO" dirty="0" smtClean="0"/>
+              <a:t>Recondition, rearm, reload</a:t>
+            </a:r>
+          </a:p>
+          <a:p>
             <a:endParaRPr lang="nb-NO" dirty="0" smtClean="0"/>
           </a:p>
           <a:p>
             <a:r>
-              <a:rPr lang="nb-NO" dirty="0" err="1" smtClean="0"/>
-              <a:t>Assault</a:t>
+              <a:rPr lang="nb-NO" dirty="0" smtClean="0"/>
+              <a:t>(With indicators on each of the phases if possible)</a:t>
             </a:r>
             <a:endParaRPr lang="nb-NO" dirty="0" smtClean="0"/>
           </a:p>
-          <a:p>
-            <a:r>
-              <a:rPr lang="nb-NO" dirty="0" err="1" smtClean="0"/>
-              <a:t>Transition</a:t>
-            </a:r>
-            <a:r>
-              <a:rPr lang="nb-NO" dirty="0" smtClean="0"/>
-              <a:t> </a:t>
-            </a:r>
-            <a:r>
-              <a:rPr lang="nb-NO" dirty="0" err="1" smtClean="0"/>
-              <a:t>into</a:t>
-            </a:r>
-            <a:r>
-              <a:rPr lang="nb-NO" dirty="0" smtClean="0"/>
-              <a:t> defensive</a:t>
-            </a:r>
-          </a:p>
-          <a:p>
-            <a:r>
-              <a:rPr lang="nb-NO" dirty="0" err="1" smtClean="0"/>
-              <a:t>Recondition</a:t>
-            </a:r>
-            <a:r>
-              <a:rPr lang="nb-NO" dirty="0" smtClean="0"/>
-              <a:t>, </a:t>
-            </a:r>
-            <a:r>
-              <a:rPr lang="nb-NO" dirty="0" err="1" smtClean="0"/>
-              <a:t>rearm</a:t>
-            </a:r>
-            <a:r>
-              <a:rPr lang="nb-NO" dirty="0" smtClean="0"/>
-              <a:t>, </a:t>
-            </a:r>
-            <a:r>
-              <a:rPr lang="nb-NO" dirty="0" err="1" smtClean="0"/>
-              <a:t>reload</a:t>
-            </a:r>
-            <a:endParaRPr lang="nb-NO" dirty="0" smtClean="0"/>
-          </a:p>
-          <a:p>
-            <a:endParaRPr lang="nb-NO" dirty="0" smtClean="0"/>
-          </a:p>
-          <a:p>
-            <a:r>
-              <a:rPr lang="nb-NO" dirty="0" smtClean="0"/>
-              <a:t>(With </a:t>
-            </a:r>
-            <a:r>
-              <a:rPr lang="nb-NO" dirty="0" err="1" smtClean="0"/>
-              <a:t>indicators</a:t>
-            </a:r>
-            <a:r>
-              <a:rPr lang="nb-NO" dirty="0" smtClean="0"/>
-              <a:t> </a:t>
-            </a:r>
-            <a:r>
-              <a:rPr lang="nb-NO" dirty="0" err="1" smtClean="0"/>
-              <a:t>on</a:t>
-            </a:r>
-            <a:r>
-              <a:rPr lang="nb-NO" dirty="0" smtClean="0"/>
-              <a:t> </a:t>
-            </a:r>
-            <a:r>
-              <a:rPr lang="nb-NO" dirty="0" err="1" smtClean="0"/>
-              <a:t>each</a:t>
-            </a:r>
-            <a:r>
-              <a:rPr lang="nb-NO" dirty="0" smtClean="0"/>
-              <a:t> </a:t>
-            </a:r>
-            <a:r>
-              <a:rPr lang="nb-NO" dirty="0" err="1" smtClean="0"/>
-              <a:t>of</a:t>
-            </a:r>
-            <a:r>
-              <a:rPr lang="nb-NO" dirty="0" smtClean="0"/>
-              <a:t> </a:t>
-            </a:r>
-            <a:r>
-              <a:rPr lang="nb-NO" dirty="0" err="1" smtClean="0"/>
-              <a:t>the</a:t>
-            </a:r>
-            <a:r>
-              <a:rPr lang="nb-NO" dirty="0" smtClean="0"/>
-              <a:t> </a:t>
-            </a:r>
-            <a:r>
-              <a:rPr lang="nb-NO" dirty="0" err="1" smtClean="0"/>
-              <a:t>phases</a:t>
-            </a:r>
-            <a:r>
-              <a:rPr lang="nb-NO" dirty="0" smtClean="0"/>
-              <a:t> </a:t>
-            </a:r>
-            <a:r>
-              <a:rPr lang="nb-NO" dirty="0" err="1" smtClean="0"/>
-              <a:t>if</a:t>
-            </a:r>
-            <a:r>
-              <a:rPr lang="nb-NO" dirty="0" smtClean="0"/>
-              <a:t> </a:t>
-            </a:r>
-            <a:r>
-              <a:rPr lang="nb-NO" dirty="0" err="1" smtClean="0"/>
-              <a:t>possible</a:t>
-            </a:r>
-            <a:r>
-              <a:rPr lang="nb-NO" dirty="0" smtClean="0"/>
-              <a:t>)</a:t>
-            </a:r>
+        </p:txBody>
+      </p:sp>
+      <p:sp>
+        <p:nvSpPr>
+          <p:cNvPr id="20" name="TekstSylinder 9"/>
+          <p:cNvSpPr txBox="1"/>
+          <p:nvPr/>
+        </p:nvSpPr>
+        <p:spPr>
+          <a:xfrm rot="18996742">
+            <a:off x="5420137" y="1745194"/>
+            <a:ext cx="2423186" cy="707886"/>
+          </a:xfrm>
+          <a:prstGeom prst="rect">
+            <a:avLst/>
+          </a:prstGeom>
+          <a:noFill/>
+        </p:spPr>
+        <p:txBody>
+          <a:bodyPr wrap="square" rtlCol="0">
+            <a:spAutoFit/>
+          </a:bodyPr>
+          <a:lstStyle/>
+          <a:p>
+            <a:r>
+              <a:rPr lang="en-US" sz="4000" b="1" dirty="0" smtClean="0">
+                <a:solidFill>
+                  <a:srgbClr val="FF0000"/>
+                </a:solidFill>
+                <a:latin typeface="Arial Black" pitchFamily="34" charset="0"/>
+              </a:rPr>
+              <a:t>DRAFT</a:t>
+            </a:r>
+            <a:endParaRPr lang="en-US" sz="4000" b="1" dirty="0">
+              <a:solidFill>
+                <a:srgbClr val="FF0000"/>
+              </a:solidFill>
+              <a:latin typeface="Arial Black" pitchFamily="34" charset="0"/>
+            </a:endParaRPr>
           </a:p>
         </p:txBody>
       </p:sp>
@@ -10344,6 +9973,46 @@
               <a:buChar char="-"/>
             </a:pPr>
             <a:endParaRPr lang="nb-NO" dirty="0" smtClean="0"/>
+          </a:p>
+        </p:txBody>
+      </p:sp>
+      <p:sp>
+        <p:nvSpPr>
+          <p:cNvPr id="20" name="TekstSylinder 9"/>
+          <p:cNvSpPr txBox="1"/>
+          <p:nvPr/>
+        </p:nvSpPr>
+        <p:spPr>
+          <a:xfrm rot="18996742">
+            <a:off x="5420137" y="1745194"/>
+            <a:ext cx="2423186" cy="707886"/>
+          </a:xfrm>
+          <a:prstGeom prst="rect">
+            <a:avLst/>
+          </a:prstGeom>
+          <a:noFill/>
+        </p:spPr>
+        <p:txBody>
+          <a:bodyPr wrap="square" rtlCol="0">
+            <a:spAutoFit/>
+          </a:bodyPr>
+          <a:lstStyle/>
+          <a:p>
+            <a:r>
+              <a:rPr lang="en-US" sz="4000" b="1" dirty="0" smtClean="0">
+                <a:solidFill>
+                  <a:srgbClr val="FF0000"/>
+                </a:solidFill>
+                <a:latin typeface="Arial Black" pitchFamily="34" charset="0"/>
+              </a:rPr>
+              <a:t>DRAFT</a:t>
+            </a:r>
+            <a:endParaRPr lang="en-US" sz="4000" b="1" dirty="0">
+              <a:solidFill>
+                <a:srgbClr val="FF0000"/>
+              </a:solidFill>
+              <a:latin typeface="Arial Black" pitchFamily="34" charset="0"/>
+            </a:endParaRPr>
           </a:p>
         </p:txBody>
       </p:sp>
@@ -11075,7 +10744,6 @@
               <a:rPr lang="nb-NO" sz="1600" dirty="0" smtClean="0"/>
               <a:t>Shape the conditions in the battlefield to be in favor of the offensive force by hindering the enemy’s ability to counter the coming offensive.</a:t>
             </a:r>
-            <a:endParaRPr lang="nb-NO" sz="1600" dirty="0" smtClean="0"/>
           </a:p>
           <a:p>
             <a:endParaRPr lang="nb-NO" sz="1600" dirty="0" smtClean="0"/>
@@ -11144,7 +10812,6 @@
               <a:rPr lang="nb-NO" sz="1600" dirty="0" smtClean="0"/>
               <a:t>Loss of contact with observation posts (Suggesting either they’ve fallen to a raid by enemy SOFs or that the communications line have been severed by enemy artillery/SOF activity</a:t>
             </a:r>
-            <a:endParaRPr lang="nb-NO" sz="1600" dirty="0" smtClean="0"/>
           </a:p>
           <a:p>
             <a:pPr marL="285750" indent="-285750">
@@ -11159,6 +10826,46 @@
               <a:buChar char="-"/>
             </a:pPr>
             <a:endParaRPr lang="nb-NO" sz="1600" dirty="0" smtClean="0"/>
+          </a:p>
+        </p:txBody>
+      </p:sp>
+      <p:sp>
+        <p:nvSpPr>
+          <p:cNvPr id="20" name="TekstSylinder 9"/>
+          <p:cNvSpPr txBox="1"/>
+          <p:nvPr/>
+        </p:nvSpPr>
+        <p:spPr>
+          <a:xfrm rot="18996742">
+            <a:off x="5420137" y="1745194"/>
+            <a:ext cx="2423186" cy="707886"/>
+          </a:xfrm>
+          <a:prstGeom prst="rect">
+            <a:avLst/>
+          </a:prstGeom>
+          <a:noFill/>
+        </p:spPr>
+        <p:txBody>
+          <a:bodyPr wrap="square" rtlCol="0">
+            <a:spAutoFit/>
+          </a:bodyPr>
+          <a:lstStyle/>
+          <a:p>
+            <a:r>
+              <a:rPr lang="en-US" sz="4000" b="1" dirty="0" smtClean="0">
+                <a:solidFill>
+                  <a:srgbClr val="FF0000"/>
+                </a:solidFill>
+                <a:latin typeface="Arial Black" pitchFamily="34" charset="0"/>
+              </a:rPr>
+              <a:t>DRAFT</a:t>
+            </a:r>
+            <a:endParaRPr lang="en-US" sz="4000" b="1" dirty="0">
+              <a:solidFill>
+                <a:srgbClr val="FF0000"/>
+              </a:solidFill>
+              <a:latin typeface="Arial Black" pitchFamily="34" charset="0"/>
+            </a:endParaRPr>
           </a:p>
         </p:txBody>
       </p:sp>
@@ -11890,7 +11597,6 @@
               <a:rPr lang="nb-NO" sz="1600" dirty="0" smtClean="0"/>
               <a:t>Utilize the unit’s manuevering forces to achieve the objective of the offensive (territorial gain or tactical or strategic condition).</a:t>
             </a:r>
-            <a:endParaRPr lang="nb-NO" sz="1600" dirty="0" smtClean="0"/>
           </a:p>
           <a:p>
             <a:endParaRPr lang="nb-NO" sz="1600" dirty="0" smtClean="0"/>
@@ -11908,7 +11614,15 @@
             </a:pPr>
             <a:r>
               <a:rPr lang="nb-NO" sz="1600" dirty="0" smtClean="0"/>
-              <a:t>Attack conducted by the a manuever by the division’s manuevering brigades</a:t>
+              <a:t>Attack conducted by </a:t>
+            </a:r>
+            <a:r>
+              <a:rPr lang="nb-NO" sz="1600" dirty="0" smtClean="0"/>
+              <a:t>the </a:t>
+            </a:r>
+            <a:r>
+              <a:rPr lang="nb-NO" sz="1600" dirty="0" smtClean="0"/>
+              <a:t>manuevering brigades</a:t>
             </a:r>
           </a:p>
           <a:p>
@@ -12687,6 +12401,169 @@
           </a:p>
         </p:txBody>
       </p:sp>
+      <p:sp>
+        <p:nvSpPr>
+          <p:cNvPr id="19" name="TekstSylinder 18"/>
+          <p:cNvSpPr txBox="1"/>
+          <p:nvPr/>
+        </p:nvSpPr>
+        <p:spPr>
+          <a:xfrm>
+            <a:off x="179512" y="1000114"/>
+            <a:ext cx="8496944" cy="4524315"/>
+          </a:xfrm>
+          <a:prstGeom prst="rect">
+            <a:avLst/>
+          </a:prstGeom>
+          <a:noFill/>
+        </p:spPr>
+        <p:txBody>
+          <a:bodyPr wrap="square" rtlCol="0">
+            <a:spAutoFit/>
+          </a:bodyPr>
+          <a:lstStyle/>
+          <a:p>
+            <a:r>
+              <a:rPr lang="nb-NO" sz="1600" b="1" dirty="0" smtClean="0"/>
+              <a:t>Purpose:</a:t>
+            </a:r>
+          </a:p>
+          <a:p>
+            <a:pPr marL="285750" indent="-285750">
+              <a:buFontTx/>
+              <a:buChar char="-"/>
+            </a:pPr>
+            <a:r>
+              <a:rPr lang="nb-NO" sz="1600" dirty="0" smtClean="0"/>
+              <a:t>Defend the territory held or seized by the division’s menuevering units against enemy expected counter attacks</a:t>
+            </a:r>
+          </a:p>
+          <a:p>
+            <a:pPr marL="285750" indent="-285750">
+              <a:buFontTx/>
+              <a:buChar char="-"/>
+            </a:pPr>
+            <a:r>
+              <a:rPr lang="nb-NO" sz="1600" dirty="0" smtClean="0"/>
+              <a:t>Optionally: Hold ground and provide cover for another division moving through seized area to continue the Corp’s offensive</a:t>
+            </a:r>
+          </a:p>
+          <a:p>
+            <a:endParaRPr lang="nb-NO" sz="1600" dirty="0" smtClean="0"/>
+          </a:p>
+          <a:p>
+            <a:endParaRPr lang="nb-NO" sz="1600" dirty="0" smtClean="0"/>
+          </a:p>
+          <a:p>
+            <a:r>
+              <a:rPr lang="nb-NO" sz="1600" b="1" dirty="0" smtClean="0"/>
+              <a:t>Activity:</a:t>
+            </a:r>
+          </a:p>
+          <a:p>
+            <a:pPr marL="285750" indent="-285750">
+              <a:buFontTx/>
+              <a:buChar char="-"/>
+            </a:pPr>
+            <a:r>
+              <a:rPr lang="nb-NO" sz="1600" dirty="0" smtClean="0"/>
+              <a:t>Combat vehicles taking defensive positions. Most preferrably on high grounds, elevated positions or revetments to be used as static positions for observation and fire</a:t>
+            </a:r>
+            <a:endParaRPr lang="nb-NO" sz="1600" dirty="0" smtClean="0"/>
+          </a:p>
+          <a:p>
+            <a:endParaRPr lang="nb-NO" sz="1600" dirty="0" smtClean="0"/>
+          </a:p>
+          <a:p>
+            <a:r>
+              <a:rPr lang="nb-NO" sz="1600" b="1" dirty="0" smtClean="0"/>
+              <a:t>Indicators:</a:t>
+            </a:r>
+          </a:p>
+          <a:p>
+            <a:pPr marL="285750" indent="-285750">
+              <a:buFontTx/>
+              <a:buChar char="-"/>
+            </a:pPr>
+            <a:r>
+              <a:rPr lang="nb-NO" sz="1600" dirty="0" smtClean="0"/>
+              <a:t>Combat vehicles in static positions, usually on elevated grounds</a:t>
+            </a:r>
+          </a:p>
+          <a:p>
+            <a:pPr marL="285750" indent="-285750">
+              <a:buFontTx/>
+              <a:buChar char="-"/>
+            </a:pPr>
+            <a:r>
+              <a:rPr lang="nb-NO" sz="1600" dirty="0" smtClean="0"/>
+              <a:t>Possible presence of logistics vehicles in/near defensive positions to resupply/service combat vehicles and personnel</a:t>
+            </a:r>
+            <a:endParaRPr lang="nb-NO" sz="1600" dirty="0" smtClean="0"/>
+          </a:p>
+          <a:p>
+            <a:pPr marL="285750" indent="-285750">
+              <a:buFontTx/>
+              <a:buChar char="-"/>
+            </a:pPr>
+            <a:endParaRPr lang="nb-NO" sz="1600" dirty="0" smtClean="0"/>
+          </a:p>
+          <a:p>
+            <a:pPr marL="285750" indent="-285750">
+              <a:buFontTx/>
+              <a:buChar char="-"/>
+            </a:pPr>
+            <a:endParaRPr lang="nb-NO" sz="1600" dirty="0" smtClean="0"/>
+          </a:p>
+          <a:p>
+            <a:pPr marL="285750" indent="-285750">
+              <a:buFontTx/>
+              <a:buChar char="-"/>
+            </a:pPr>
+            <a:endParaRPr lang="nb-NO" sz="1600" dirty="0" smtClean="0"/>
+          </a:p>
+        </p:txBody>
+      </p:sp>
+      <p:sp>
+        <p:nvSpPr>
+          <p:cNvPr id="20" name="TekstSylinder 9"/>
+          <p:cNvSpPr txBox="1"/>
+          <p:nvPr/>
+        </p:nvSpPr>
+        <p:spPr>
+          <a:xfrm rot="18996742">
+            <a:off x="5420137" y="1745194"/>
+            <a:ext cx="2423186" cy="707886"/>
+          </a:xfrm>
+          <a:prstGeom prst="rect">
+            <a:avLst/>
+          </a:prstGeom>
+          <a:noFill/>
+        </p:spPr>
+        <p:txBody>
+          <a:bodyPr wrap="square" rtlCol="0">
+            <a:spAutoFit/>
+          </a:bodyPr>
+          <a:lstStyle/>
+          <a:p>
+            <a:r>
+              <a:rPr lang="en-US" sz="4000" b="1" dirty="0" smtClean="0">
+                <a:solidFill>
+                  <a:srgbClr val="FF0000"/>
+                </a:solidFill>
+                <a:latin typeface="Arial Black" pitchFamily="34" charset="0"/>
+              </a:rPr>
+              <a:t>DRAFT</a:t>
+            </a:r>
+            <a:endParaRPr lang="en-US" sz="4000" b="1" dirty="0">
+              <a:solidFill>
+                <a:srgbClr val="FF0000"/>
+              </a:solidFill>
+              <a:latin typeface="Arial Black" pitchFamily="34" charset="0"/>
+            </a:endParaRPr>
+          </a:p>
+        </p:txBody>
+      </p:sp>
     </p:spTree>
   </p:cSld>
   <p:clrMapOvr>
@@ -12729,16 +12606,25 @@
             <p:ph type="title"/>
           </p:nvPr>
         </p:nvSpPr>
-        <p:spPr/>
+        <p:spPr>
+          <a:xfrm>
+            <a:off x="36512" y="267494"/>
+            <a:ext cx="9144000" cy="732620"/>
+          </a:xfrm>
+        </p:spPr>
         <p:txBody>
           <a:bodyPr/>
           <a:lstStyle/>
           <a:p>
             <a:r>
-              <a:rPr lang="en-US" dirty="0" smtClean="0"/>
-              <a:t>USE OF SHOCK BATTALIONS</a:t>
-            </a:r>
-            <a:endParaRPr lang="en-US" dirty="0"/>
+              <a:rPr lang="en-US" sz="2000" dirty="0" smtClean="0"/>
+              <a:t>USE OF SHOCK </a:t>
+            </a:r>
+            <a:r>
+              <a:rPr lang="en-US" sz="2000" dirty="0" smtClean="0"/>
+              <a:t>BATTALIONS / Special Operations forces</a:t>
+            </a:r>
+            <a:endParaRPr lang="en-US" sz="2000" dirty="0"/>
           </a:p>
         </p:txBody>
       </p:sp>
@@ -13363,6 +13249,189 @@
               <a:t>F</a:t>
             </a:r>
             <a:endParaRPr lang="nb-NO" sz="1200" dirty="0"/>
+          </a:p>
+        </p:txBody>
+      </p:sp>
+      <p:sp>
+        <p:nvSpPr>
+          <p:cNvPr id="19" name="TekstSylinder 18"/>
+          <p:cNvSpPr txBox="1"/>
+          <p:nvPr/>
+        </p:nvSpPr>
+        <p:spPr>
+          <a:xfrm>
+            <a:off x="179512" y="1000114"/>
+            <a:ext cx="8496944" cy="5016758"/>
+          </a:xfrm>
+          <a:prstGeom prst="rect">
+            <a:avLst/>
+          </a:prstGeom>
+          <a:noFill/>
+        </p:spPr>
+        <p:txBody>
+          <a:bodyPr wrap="square" rtlCol="0">
+            <a:spAutoFit/>
+          </a:bodyPr>
+          <a:lstStyle/>
+          <a:p>
+            <a:r>
+              <a:rPr lang="nb-NO" sz="1600" b="1" dirty="0" smtClean="0"/>
+              <a:t>Purpose:</a:t>
+            </a:r>
+          </a:p>
+          <a:p>
+            <a:pPr marL="285750" indent="-285750">
+              <a:buFontTx/>
+              <a:buChar char="-"/>
+            </a:pPr>
+            <a:r>
+              <a:rPr lang="nb-NO" sz="1600" dirty="0" smtClean="0"/>
+              <a:t>Use of small forces to shape conditions for the main offensive effort</a:t>
+            </a:r>
+          </a:p>
+          <a:p>
+            <a:endParaRPr lang="nb-NO" sz="1600" dirty="0" smtClean="0"/>
+          </a:p>
+          <a:p>
+            <a:r>
+              <a:rPr lang="nb-NO" sz="1600" b="1" dirty="0" smtClean="0"/>
+              <a:t>Activity:</a:t>
+            </a:r>
+          </a:p>
+          <a:p>
+            <a:pPr marL="285750" indent="-285750">
+              <a:buFontTx/>
+              <a:buChar char="-"/>
+            </a:pPr>
+            <a:r>
+              <a:rPr lang="nb-NO" sz="1600" dirty="0" smtClean="0"/>
+              <a:t>Move ahead of main Divisional forces for intelligence gathering, scouting and assesing enemy strength and deployments (finding week areas etc)</a:t>
+            </a:r>
+          </a:p>
+          <a:p>
+            <a:pPr marL="285750" indent="-285750">
+              <a:buFontTx/>
+              <a:buChar char="-"/>
+            </a:pPr>
+            <a:r>
+              <a:rPr lang="nb-NO" sz="1600" dirty="0" smtClean="0"/>
+              <a:t>Infiltrate into enemy-held areas for specific operations such as:</a:t>
+            </a:r>
+          </a:p>
+          <a:p>
+            <a:pPr marL="742950" lvl="1" indent="-285750">
+              <a:buFontTx/>
+              <a:buChar char="-"/>
+            </a:pPr>
+            <a:r>
+              <a:rPr lang="nb-NO" sz="1600" dirty="0" smtClean="0"/>
+              <a:t>Destroy bridges/ mine roads / place IEDs / set ambush points -  to disrupt enemy movements (reinforcements and maneuvers)</a:t>
+            </a:r>
+          </a:p>
+          <a:p>
+            <a:pPr marL="742950" lvl="1" indent="-285750">
+              <a:buFontTx/>
+              <a:buChar char="-"/>
+            </a:pPr>
+            <a:r>
+              <a:rPr lang="nb-NO" sz="1600" dirty="0" smtClean="0"/>
+              <a:t>Attack command posts and communication sites to disrupt enemy Command&amp;Control capabilities</a:t>
+            </a:r>
+            <a:endParaRPr lang="nb-NO" sz="1600" dirty="0" smtClean="0"/>
+          </a:p>
+          <a:p>
+            <a:endParaRPr lang="nb-NO" sz="1600" dirty="0" smtClean="0"/>
+          </a:p>
+          <a:p>
+            <a:r>
+              <a:rPr lang="nb-NO" sz="1600" b="1" dirty="0" smtClean="0"/>
+              <a:t>Indicators:</a:t>
+            </a:r>
+          </a:p>
+          <a:p>
+            <a:pPr marL="285750" indent="-285750">
+              <a:buFontTx/>
+              <a:buChar char="-"/>
+            </a:pPr>
+            <a:r>
+              <a:rPr lang="nb-NO" sz="1600" dirty="0" smtClean="0"/>
+              <a:t>Signs of attacks / hostile activities inside friendly soil, up to several miles from the FLOT that are NOT part of a major offensive</a:t>
+            </a:r>
+          </a:p>
+          <a:p>
+            <a:pPr marL="285750" indent="-285750">
+              <a:buFontTx/>
+              <a:buChar char="-"/>
+            </a:pPr>
+            <a:r>
+              <a:rPr lang="nb-NO" sz="1600" dirty="0" smtClean="0"/>
+              <a:t>Loss of contact with outposts or units </a:t>
+            </a:r>
+          </a:p>
+          <a:p>
+            <a:pPr lvl="1"/>
+            <a:endParaRPr lang="nb-NO" sz="1600" dirty="0" smtClean="0"/>
+          </a:p>
+          <a:p>
+            <a:pPr marL="285750" indent="-285750">
+              <a:buFontTx/>
+              <a:buChar char="-"/>
+            </a:pPr>
+            <a:endParaRPr lang="nb-NO" sz="1600" dirty="0" smtClean="0"/>
+          </a:p>
+          <a:p>
+            <a:pPr marL="285750" indent="-285750">
+              <a:buFontTx/>
+              <a:buChar char="-"/>
+            </a:pPr>
+            <a:endParaRPr lang="nb-NO" sz="1600" dirty="0" smtClean="0"/>
+          </a:p>
+          <a:p>
+            <a:pPr marL="285750" indent="-285750">
+              <a:buFontTx/>
+              <a:buChar char="-"/>
+            </a:pPr>
+            <a:endParaRPr lang="nb-NO" sz="1600" dirty="0" smtClean="0"/>
+          </a:p>
+        </p:txBody>
+      </p:sp>
+      <p:sp>
+        <p:nvSpPr>
+          <p:cNvPr id="20" name="TekstSylinder 9"/>
+          <p:cNvSpPr txBox="1"/>
+          <p:nvPr/>
+        </p:nvSpPr>
+        <p:spPr>
+          <a:xfrm rot="18996742">
+            <a:off x="5420137" y="1745194"/>
+            <a:ext cx="2423186" cy="707886"/>
+          </a:xfrm>
+          <a:prstGeom prst="rect">
+            <a:avLst/>
+          </a:prstGeom>
+          <a:noFill/>
+        </p:spPr>
+        <p:txBody>
+          <a:bodyPr wrap="square" rtlCol="0">
+            <a:spAutoFit/>
+          </a:bodyPr>
+          <a:lstStyle/>
+          <a:p>
+            <a:r>
+              <a:rPr lang="en-US" sz="4000" b="1" dirty="0" smtClean="0">
+                <a:solidFill>
+                  <a:srgbClr val="FF0000"/>
+                </a:solidFill>
+                <a:latin typeface="Arial Black" pitchFamily="34" charset="0"/>
+              </a:rPr>
+              <a:t>DRAFT</a:t>
+            </a:r>
+            <a:endParaRPr lang="en-US" sz="4000" b="1" dirty="0">
+              <a:solidFill>
+                <a:srgbClr val="FF0000"/>
+              </a:solidFill>
+              <a:latin typeface="Arial Black" pitchFamily="34" charset="0"/>
+            </a:endParaRPr>
           </a:p>
         </p:txBody>
       </p:sp>

</xml_diff>